<commit_message>
ms revision on 20220828
</commit_message>
<xml_diff>
--- a/figures/database_snapshot.pptx
+++ b/figures/database_snapshot.pptx
@@ -10,7 +10,8 @@
     <p:sldId id="258" r:id="rId4"/>
     <p:sldId id="259" r:id="rId5"/>
     <p:sldId id="260" r:id="rId6"/>
-    <p:sldId id="261" r:id="rId7"/>
+    <p:sldId id="262" r:id="rId7"/>
+    <p:sldId id="261" r:id="rId8"/>
   </p:sldIdLst>
   <p:sldSz cx="12192000" cy="6858000"/>
   <p:notesSz cx="6858000" cy="9144000"/>
@@ -266,7 +267,7 @@
           <a:p>
             <a:fld id="{9915773D-6D45-A545-9BEA-022AEEFB4CE4}" type="datetimeFigureOut">
               <a:rPr lang="en-JP" smtClean="0"/>
-              <a:t>2022/04/20</a:t>
+              <a:t>2022/08/28</a:t>
             </a:fld>
             <a:endParaRPr lang="en-JP"/>
           </a:p>
@@ -466,7 +467,7 @@
           <a:p>
             <a:fld id="{9915773D-6D45-A545-9BEA-022AEEFB4CE4}" type="datetimeFigureOut">
               <a:rPr lang="en-JP" smtClean="0"/>
-              <a:t>2022/04/20</a:t>
+              <a:t>2022/08/28</a:t>
             </a:fld>
             <a:endParaRPr lang="en-JP"/>
           </a:p>
@@ -676,7 +677,7 @@
           <a:p>
             <a:fld id="{9915773D-6D45-A545-9BEA-022AEEFB4CE4}" type="datetimeFigureOut">
               <a:rPr lang="en-JP" smtClean="0"/>
-              <a:t>2022/04/20</a:t>
+              <a:t>2022/08/28</a:t>
             </a:fld>
             <a:endParaRPr lang="en-JP"/>
           </a:p>
@@ -876,7 +877,7 @@
           <a:p>
             <a:fld id="{9915773D-6D45-A545-9BEA-022AEEFB4CE4}" type="datetimeFigureOut">
               <a:rPr lang="en-JP" smtClean="0"/>
-              <a:t>2022/04/20</a:t>
+              <a:t>2022/08/28</a:t>
             </a:fld>
             <a:endParaRPr lang="en-JP"/>
           </a:p>
@@ -1152,7 +1153,7 @@
           <a:p>
             <a:fld id="{9915773D-6D45-A545-9BEA-022AEEFB4CE4}" type="datetimeFigureOut">
               <a:rPr lang="en-JP" smtClean="0"/>
-              <a:t>2022/04/20</a:t>
+              <a:t>2022/08/28</a:t>
             </a:fld>
             <a:endParaRPr lang="en-JP"/>
           </a:p>
@@ -1420,7 +1421,7 @@
           <a:p>
             <a:fld id="{9915773D-6D45-A545-9BEA-022AEEFB4CE4}" type="datetimeFigureOut">
               <a:rPr lang="en-JP" smtClean="0"/>
-              <a:t>2022/04/20</a:t>
+              <a:t>2022/08/28</a:t>
             </a:fld>
             <a:endParaRPr lang="en-JP"/>
           </a:p>
@@ -1835,7 +1836,7 @@
           <a:p>
             <a:fld id="{9915773D-6D45-A545-9BEA-022AEEFB4CE4}" type="datetimeFigureOut">
               <a:rPr lang="en-JP" smtClean="0"/>
-              <a:t>2022/04/20</a:t>
+              <a:t>2022/08/28</a:t>
             </a:fld>
             <a:endParaRPr lang="en-JP"/>
           </a:p>
@@ -1977,7 +1978,7 @@
           <a:p>
             <a:fld id="{9915773D-6D45-A545-9BEA-022AEEFB4CE4}" type="datetimeFigureOut">
               <a:rPr lang="en-JP" smtClean="0"/>
-              <a:t>2022/04/20</a:t>
+              <a:t>2022/08/28</a:t>
             </a:fld>
             <a:endParaRPr lang="en-JP"/>
           </a:p>
@@ -2090,7 +2091,7 @@
           <a:p>
             <a:fld id="{9915773D-6D45-A545-9BEA-022AEEFB4CE4}" type="datetimeFigureOut">
               <a:rPr lang="en-JP" smtClean="0"/>
-              <a:t>2022/04/20</a:t>
+              <a:t>2022/08/28</a:t>
             </a:fld>
             <a:endParaRPr lang="en-JP"/>
           </a:p>
@@ -2403,7 +2404,7 @@
           <a:p>
             <a:fld id="{9915773D-6D45-A545-9BEA-022AEEFB4CE4}" type="datetimeFigureOut">
               <a:rPr lang="en-JP" smtClean="0"/>
-              <a:t>2022/04/20</a:t>
+              <a:t>2022/08/28</a:t>
             </a:fld>
             <a:endParaRPr lang="en-JP"/>
           </a:p>
@@ -2692,7 +2693,7 @@
           <a:p>
             <a:fld id="{9915773D-6D45-A545-9BEA-022AEEFB4CE4}" type="datetimeFigureOut">
               <a:rPr lang="en-JP" smtClean="0"/>
-              <a:t>2022/04/20</a:t>
+              <a:t>2022/08/28</a:t>
             </a:fld>
             <a:endParaRPr lang="en-JP"/>
           </a:p>
@@ -2935,7 +2936,7 @@
           <a:p>
             <a:fld id="{9915773D-6D45-A545-9BEA-022AEEFB4CE4}" type="datetimeFigureOut">
               <a:rPr lang="en-JP" smtClean="0"/>
-              <a:t>2022/04/20</a:t>
+              <a:t>2022/08/28</a:t>
             </a:fld>
             <a:endParaRPr lang="en-JP"/>
           </a:p>
@@ -3577,7 +3578,7 @@
         </p:blipFill>
         <p:spPr>
           <a:xfrm>
-            <a:off x="0" y="890016"/>
+            <a:off x="0" y="3182112"/>
             <a:ext cx="12192000" cy="3669792"/>
           </a:xfrm>
           <a:prstGeom prst="rect">
@@ -3585,6 +3586,146 @@
           </a:prstGeom>
         </p:spPr>
       </p:pic>
+      <p:pic>
+        <p:nvPicPr>
+          <p:cNvPr id="2" name="Picture 1">
+            <a:extLst>
+              <a:ext uri="{FF2B5EF4-FFF2-40B4-BE49-F238E27FC236}">
+                <a16:creationId xmlns:a16="http://schemas.microsoft.com/office/drawing/2014/main" id="{DD5C47EC-465C-C6FB-622A-45E544D52CC1}"/>
+              </a:ext>
+            </a:extLst>
+          </p:cNvPr>
+          <p:cNvPicPr>
+            <a:picLocks noChangeAspect="1"/>
+          </p:cNvPicPr>
+          <p:nvPr/>
+        </p:nvPicPr>
+        <p:blipFill rotWithShape="1">
+          <a:blip r:embed="rId3"/>
+          <a:srcRect l="51197" t="49828" r="4512" b="6489"/>
+          <a:stretch/>
+        </p:blipFill>
+        <p:spPr>
+          <a:xfrm>
+            <a:off x="12192" y="64439"/>
+            <a:ext cx="5400000" cy="2995753"/>
+          </a:xfrm>
+          <a:prstGeom prst="rect">
+            <a:avLst/>
+          </a:prstGeom>
+        </p:spPr>
+      </p:pic>
+      <p:sp>
+        <p:nvSpPr>
+          <p:cNvPr id="3" name="TextBox 2">
+            <a:extLst>
+              <a:ext uri="{FF2B5EF4-FFF2-40B4-BE49-F238E27FC236}">
+                <a16:creationId xmlns:a16="http://schemas.microsoft.com/office/drawing/2014/main" id="{54C638C1-5CD3-A51E-15F9-AEBCFA205870}"/>
+              </a:ext>
+            </a:extLst>
+          </p:cNvPr>
+          <p:cNvSpPr txBox="1"/>
+          <p:nvPr/>
+        </p:nvSpPr>
+        <p:spPr>
+          <a:xfrm>
+            <a:off x="109728" y="158496"/>
+            <a:ext cx="436338" cy="369332"/>
+          </a:xfrm>
+          <a:prstGeom prst="rect">
+            <a:avLst/>
+          </a:prstGeom>
+          <a:noFill/>
+        </p:spPr>
+        <p:txBody>
+          <a:bodyPr wrap="none" rtlCol="0">
+            <a:spAutoFit/>
+          </a:bodyPr>
+          <a:lstStyle/>
+          <a:p>
+            <a:r>
+              <a:rPr lang="en-JP" dirty="0"/>
+              <a:t>(a)</a:t>
+            </a:r>
+          </a:p>
+        </p:txBody>
+      </p:sp>
+      <p:sp>
+        <p:nvSpPr>
+          <p:cNvPr id="4" name="TextBox 3">
+            <a:extLst>
+              <a:ext uri="{FF2B5EF4-FFF2-40B4-BE49-F238E27FC236}">
+                <a16:creationId xmlns:a16="http://schemas.microsoft.com/office/drawing/2014/main" id="{5CA64AA5-7586-FA84-0318-F14B5854173B}"/>
+              </a:ext>
+            </a:extLst>
+          </p:cNvPr>
+          <p:cNvSpPr txBox="1"/>
+          <p:nvPr/>
+        </p:nvSpPr>
+        <p:spPr>
+          <a:xfrm>
+            <a:off x="109728" y="2704838"/>
+            <a:ext cx="447558" cy="369332"/>
+          </a:xfrm>
+          <a:prstGeom prst="rect">
+            <a:avLst/>
+          </a:prstGeom>
+          <a:noFill/>
+        </p:spPr>
+        <p:txBody>
+          <a:bodyPr wrap="none" rtlCol="0">
+            <a:spAutoFit/>
+          </a:bodyPr>
+          <a:lstStyle/>
+          <a:p>
+            <a:r>
+              <a:rPr lang="en-JP" dirty="0"/>
+              <a:t>(b)</a:t>
+            </a:r>
+          </a:p>
+        </p:txBody>
+      </p:sp>
+      <p:sp>
+        <p:nvSpPr>
+          <p:cNvPr id="6" name="TextBox 5">
+            <a:extLst>
+              <a:ext uri="{FF2B5EF4-FFF2-40B4-BE49-F238E27FC236}">
+                <a16:creationId xmlns:a16="http://schemas.microsoft.com/office/drawing/2014/main" id="{BD0867FC-98F7-A34B-4605-292C58B0E39B}"/>
+              </a:ext>
+            </a:extLst>
+          </p:cNvPr>
+          <p:cNvSpPr txBox="1"/>
+          <p:nvPr/>
+        </p:nvSpPr>
+        <p:spPr>
+          <a:xfrm rot="16200000">
+            <a:off x="-419960" y="1446788"/>
+            <a:ext cx="1460656" cy="307777"/>
+          </a:xfrm>
+          <a:prstGeom prst="rect">
+            <a:avLst/>
+          </a:prstGeom>
+          <a:solidFill>
+            <a:schemeClr val="bg1"/>
+          </a:solidFill>
+        </p:spPr>
+        <p:txBody>
+          <a:bodyPr wrap="none" rtlCol="0">
+            <a:spAutoFit/>
+          </a:bodyPr>
+          <a:lstStyle/>
+          <a:p>
+            <a:r>
+              <a:rPr lang="en-US" sz="1400" dirty="0"/>
+              <a:t>l</a:t>
+            </a:r>
+            <a:r>
+              <a:rPr lang="en-JP" sz="1400" dirty="0"/>
+              <a:t>og(no. of aphids)</a:t>
+            </a:r>
+          </a:p>
+        </p:txBody>
+      </p:sp>
     </p:spTree>
     <p:extLst>
       <p:ext uri="{BB962C8B-B14F-4D97-AF65-F5344CB8AC3E}">
@@ -3676,10 +3817,10 @@
       </p:grpSpPr>
       <p:pic>
         <p:nvPicPr>
-          <p:cNvPr id="5" name="Picture 4">
-            <a:extLst>
-              <a:ext uri="{FF2B5EF4-FFF2-40B4-BE49-F238E27FC236}">
-                <a16:creationId xmlns:a16="http://schemas.microsoft.com/office/drawing/2014/main" id="{C4F36E06-6134-E64F-8524-3B2C9DB61049}"/>
+          <p:cNvPr id="35" name="Picture 34">
+            <a:extLst>
+              <a:ext uri="{FF2B5EF4-FFF2-40B4-BE49-F238E27FC236}">
+                <a16:creationId xmlns:a16="http://schemas.microsoft.com/office/drawing/2014/main" id="{F2B51A1F-1636-2ED5-4EA0-57ADDCDBC466}"/>
               </a:ext>
             </a:extLst>
           </p:cNvPr>
@@ -3688,8 +3829,37 @@
           </p:cNvPicPr>
           <p:nvPr/>
         </p:nvPicPr>
+        <p:blipFill rotWithShape="1">
+          <a:blip r:embed="rId2"/>
+          <a:srcRect l="19700" t="40501"/>
+          <a:stretch/>
+        </p:blipFill>
+        <p:spPr>
+          <a:xfrm>
+            <a:off x="2382787" y="-458903"/>
+            <a:ext cx="9328377" cy="3888000"/>
+          </a:xfrm>
+          <a:prstGeom prst="rect">
+            <a:avLst/>
+          </a:prstGeom>
+        </p:spPr>
+      </p:pic>
+      <p:pic>
+        <p:nvPicPr>
+          <p:cNvPr id="5" name="Picture 4">
+            <a:extLst>
+              <a:ext uri="{FF2B5EF4-FFF2-40B4-BE49-F238E27FC236}">
+                <a16:creationId xmlns:a16="http://schemas.microsoft.com/office/drawing/2014/main" id="{C4F36E06-6134-E64F-8524-3B2C9DB61049}"/>
+              </a:ext>
+            </a:extLst>
+          </p:cNvPr>
+          <p:cNvPicPr>
+            <a:picLocks noChangeAspect="1"/>
+          </p:cNvPicPr>
+          <p:nvPr/>
+        </p:nvPicPr>
         <p:blipFill>
-          <a:blip r:embed="rId2"/>
+          <a:blip r:embed="rId3"/>
           <a:stretch>
             <a:fillRect/>
           </a:stretch>
@@ -3719,14 +3889,14 @@
           <p:nvPr/>
         </p:nvPicPr>
         <p:blipFill rotWithShape="1">
-          <a:blip r:embed="rId3"/>
+          <a:blip r:embed="rId2"/>
           <a:srcRect l="19700" t="40501"/>
           <a:stretch/>
         </p:blipFill>
         <p:spPr>
           <a:xfrm>
-            <a:off x="265798" y="707136"/>
-            <a:ext cx="6264000" cy="2610792"/>
+            <a:off x="-6608120" y="446400"/>
+            <a:ext cx="7341775" cy="3060000"/>
           </a:xfrm>
           <a:prstGeom prst="rect">
             <a:avLst/>
@@ -3763,59 +3933,685 @@
           </a:prstGeom>
         </p:spPr>
       </p:pic>
-      <p:pic>
-        <p:nvPicPr>
-          <p:cNvPr id="12" name="Picture 11">
-            <a:extLst>
-              <a:ext uri="{FF2B5EF4-FFF2-40B4-BE49-F238E27FC236}">
-                <a16:creationId xmlns:a16="http://schemas.microsoft.com/office/drawing/2014/main" id="{FDBE3E56-70CC-FC45-8562-A430A99A83BE}"/>
-              </a:ext>
-            </a:extLst>
-          </p:cNvPr>
-          <p:cNvPicPr>
-            <a:picLocks noChangeAspect="1"/>
-          </p:cNvPicPr>
-          <p:nvPr/>
-        </p:nvPicPr>
-        <p:blipFill rotWithShape="1">
-          <a:blip r:embed="rId5"/>
-          <a:srcRect l="51197" t="49828" r="4512" b="6489"/>
-          <a:stretch/>
-        </p:blipFill>
-        <p:spPr>
-          <a:xfrm>
-            <a:off x="6552602" y="326567"/>
-            <a:ext cx="5400000" cy="2995753"/>
+      <p:cxnSp>
+        <p:nvCxnSpPr>
+          <p:cNvPr id="3" name="Straight Arrow Connector 2">
+            <a:extLst>
+              <a:ext uri="{FF2B5EF4-FFF2-40B4-BE49-F238E27FC236}">
+                <a16:creationId xmlns:a16="http://schemas.microsoft.com/office/drawing/2014/main" id="{3D4A6D9F-24E5-2FF1-3833-0BEDCE174AC5}"/>
+              </a:ext>
+            </a:extLst>
+          </p:cNvPr>
+          <p:cNvCxnSpPr/>
+          <p:nvPr/>
+        </p:nvCxnSpPr>
+        <p:spPr>
+          <a:xfrm flipH="1">
+            <a:off x="3405539" y="1896706"/>
+            <a:ext cx="1980000" cy="0"/>
+          </a:xfrm>
+          <a:prstGeom prst="straightConnector1">
+            <a:avLst/>
+          </a:prstGeom>
+          <a:ln w="28575">
+            <a:solidFill>
+              <a:schemeClr val="tx1"/>
+            </a:solidFill>
+            <a:tailEnd type="triangle"/>
+          </a:ln>
+        </p:spPr>
+        <p:style>
+          <a:lnRef idx="1">
+            <a:schemeClr val="accent1"/>
+          </a:lnRef>
+          <a:fillRef idx="0">
+            <a:schemeClr val="accent1"/>
+          </a:fillRef>
+          <a:effectRef idx="0">
+            <a:schemeClr val="accent1"/>
+          </a:effectRef>
+          <a:fontRef idx="minor">
+            <a:schemeClr val="tx1"/>
+          </a:fontRef>
+        </p:style>
+      </p:cxnSp>
+      <p:cxnSp>
+        <p:nvCxnSpPr>
+          <p:cNvPr id="4" name="Straight Arrow Connector 3">
+            <a:extLst>
+              <a:ext uri="{FF2B5EF4-FFF2-40B4-BE49-F238E27FC236}">
+                <a16:creationId xmlns:a16="http://schemas.microsoft.com/office/drawing/2014/main" id="{1B974410-BA72-0C17-58AA-FBA7688A37C3}"/>
+              </a:ext>
+            </a:extLst>
+          </p:cNvPr>
+          <p:cNvCxnSpPr/>
+          <p:nvPr/>
+        </p:nvCxnSpPr>
+        <p:spPr>
+          <a:xfrm flipH="1">
+            <a:off x="-5794926" y="2553337"/>
+            <a:ext cx="1512000" cy="0"/>
+          </a:xfrm>
+          <a:prstGeom prst="straightConnector1">
+            <a:avLst/>
+          </a:prstGeom>
+          <a:ln w="28575">
+            <a:solidFill>
+              <a:schemeClr val="tx1"/>
+            </a:solidFill>
+            <a:tailEnd type="triangle"/>
+          </a:ln>
+        </p:spPr>
+        <p:style>
+          <a:lnRef idx="1">
+            <a:schemeClr val="accent1"/>
+          </a:lnRef>
+          <a:fillRef idx="0">
+            <a:schemeClr val="accent1"/>
+          </a:fillRef>
+          <a:effectRef idx="0">
+            <a:schemeClr val="accent1"/>
+          </a:effectRef>
+          <a:fontRef idx="minor">
+            <a:schemeClr val="tx1"/>
+          </a:fontRef>
+        </p:style>
+      </p:cxnSp>
+      <p:cxnSp>
+        <p:nvCxnSpPr>
+          <p:cNvPr id="7" name="Straight Arrow Connector 6">
+            <a:extLst>
+              <a:ext uri="{FF2B5EF4-FFF2-40B4-BE49-F238E27FC236}">
+                <a16:creationId xmlns:a16="http://schemas.microsoft.com/office/drawing/2014/main" id="{CF4534B1-E5B8-75FA-B8CF-B1DF5D7F187D}"/>
+              </a:ext>
+            </a:extLst>
+          </p:cNvPr>
+          <p:cNvCxnSpPr>
+            <a:cxnSpLocks/>
+          </p:cNvCxnSpPr>
+          <p:nvPr/>
+        </p:nvCxnSpPr>
+        <p:spPr>
+          <a:xfrm>
+            <a:off x="-6428718" y="2041273"/>
+            <a:ext cx="792000" cy="0"/>
+          </a:xfrm>
+          <a:prstGeom prst="straightConnector1">
+            <a:avLst/>
+          </a:prstGeom>
+          <a:ln w="28575">
+            <a:solidFill>
+              <a:schemeClr val="tx1"/>
+            </a:solidFill>
+            <a:tailEnd type="triangle"/>
+          </a:ln>
+        </p:spPr>
+        <p:style>
+          <a:lnRef idx="1">
+            <a:schemeClr val="accent1"/>
+          </a:lnRef>
+          <a:fillRef idx="0">
+            <a:schemeClr val="accent1"/>
+          </a:fillRef>
+          <a:effectRef idx="0">
+            <a:schemeClr val="accent1"/>
+          </a:effectRef>
+          <a:fontRef idx="minor">
+            <a:schemeClr val="tx1"/>
+          </a:fontRef>
+        </p:style>
+      </p:cxnSp>
+      <p:cxnSp>
+        <p:nvCxnSpPr>
+          <p:cNvPr id="10" name="Straight Arrow Connector 9">
+            <a:extLst>
+              <a:ext uri="{FF2B5EF4-FFF2-40B4-BE49-F238E27FC236}">
+                <a16:creationId xmlns:a16="http://schemas.microsoft.com/office/drawing/2014/main" id="{0D4D12EF-6B3D-FC0C-883A-7F2D62CC7D65}"/>
+              </a:ext>
+            </a:extLst>
+          </p:cNvPr>
+          <p:cNvCxnSpPr>
+            <a:cxnSpLocks/>
+          </p:cNvCxnSpPr>
+          <p:nvPr/>
+        </p:nvCxnSpPr>
+        <p:spPr>
+          <a:xfrm>
+            <a:off x="-4032990" y="2035177"/>
+            <a:ext cx="648000" cy="0"/>
+          </a:xfrm>
+          <a:prstGeom prst="straightConnector1">
+            <a:avLst/>
+          </a:prstGeom>
+          <a:ln w="28575">
+            <a:solidFill>
+              <a:schemeClr val="tx1"/>
+            </a:solidFill>
+            <a:tailEnd type="triangle"/>
+          </a:ln>
+        </p:spPr>
+        <p:style>
+          <a:lnRef idx="1">
+            <a:schemeClr val="accent1"/>
+          </a:lnRef>
+          <a:fillRef idx="0">
+            <a:schemeClr val="accent1"/>
+          </a:fillRef>
+          <a:effectRef idx="0">
+            <a:schemeClr val="accent1"/>
+          </a:effectRef>
+          <a:fontRef idx="minor">
+            <a:schemeClr val="tx1"/>
+          </a:fontRef>
+        </p:style>
+      </p:cxnSp>
+      <p:cxnSp>
+        <p:nvCxnSpPr>
+          <p:cNvPr id="11" name="Straight Arrow Connector 10">
+            <a:extLst>
+              <a:ext uri="{FF2B5EF4-FFF2-40B4-BE49-F238E27FC236}">
+                <a16:creationId xmlns:a16="http://schemas.microsoft.com/office/drawing/2014/main" id="{D37C0E23-5931-19C1-5AEC-53023545F41B}"/>
+              </a:ext>
+            </a:extLst>
+          </p:cNvPr>
+          <p:cNvCxnSpPr>
+            <a:cxnSpLocks/>
+          </p:cNvCxnSpPr>
+          <p:nvPr/>
+        </p:nvCxnSpPr>
+        <p:spPr>
+          <a:xfrm>
+            <a:off x="-3453870" y="2541145"/>
+            <a:ext cx="612000" cy="0"/>
+          </a:xfrm>
+          <a:prstGeom prst="straightConnector1">
+            <a:avLst/>
+          </a:prstGeom>
+          <a:ln w="28575">
+            <a:solidFill>
+              <a:schemeClr val="tx1"/>
+            </a:solidFill>
+            <a:tailEnd type="triangle"/>
+          </a:ln>
+        </p:spPr>
+        <p:style>
+          <a:lnRef idx="1">
+            <a:schemeClr val="accent1"/>
+          </a:lnRef>
+          <a:fillRef idx="0">
+            <a:schemeClr val="accent1"/>
+          </a:fillRef>
+          <a:effectRef idx="0">
+            <a:schemeClr val="accent1"/>
+          </a:effectRef>
+          <a:fontRef idx="minor">
+            <a:schemeClr val="tx1"/>
+          </a:fontRef>
+        </p:style>
+      </p:cxnSp>
+      <p:cxnSp>
+        <p:nvCxnSpPr>
+          <p:cNvPr id="13" name="Straight Arrow Connector 12">
+            <a:extLst>
+              <a:ext uri="{FF2B5EF4-FFF2-40B4-BE49-F238E27FC236}">
+                <a16:creationId xmlns:a16="http://schemas.microsoft.com/office/drawing/2014/main" id="{70966755-D1FB-A9F0-1B4D-14011D445F7F}"/>
+              </a:ext>
+            </a:extLst>
+          </p:cNvPr>
+          <p:cNvCxnSpPr>
+            <a:cxnSpLocks/>
+          </p:cNvCxnSpPr>
+          <p:nvPr/>
+        </p:nvCxnSpPr>
+        <p:spPr>
+          <a:xfrm>
+            <a:off x="-3435582" y="2291209"/>
+            <a:ext cx="540000" cy="0"/>
+          </a:xfrm>
+          <a:prstGeom prst="straightConnector1">
+            <a:avLst/>
+          </a:prstGeom>
+          <a:ln w="28575">
+            <a:solidFill>
+              <a:schemeClr val="tx1"/>
+            </a:solidFill>
+            <a:tailEnd type="triangle"/>
+          </a:ln>
+        </p:spPr>
+        <p:style>
+          <a:lnRef idx="1">
+            <a:schemeClr val="accent1"/>
+          </a:lnRef>
+          <a:fillRef idx="0">
+            <a:schemeClr val="accent1"/>
+          </a:fillRef>
+          <a:effectRef idx="0">
+            <a:schemeClr val="accent1"/>
+          </a:effectRef>
+          <a:fontRef idx="minor">
+            <a:schemeClr val="tx1"/>
+          </a:fontRef>
+        </p:style>
+      </p:cxnSp>
+      <p:cxnSp>
+        <p:nvCxnSpPr>
+          <p:cNvPr id="14" name="Straight Arrow Connector 13">
+            <a:extLst>
+              <a:ext uri="{FF2B5EF4-FFF2-40B4-BE49-F238E27FC236}">
+                <a16:creationId xmlns:a16="http://schemas.microsoft.com/office/drawing/2014/main" id="{6FC57805-1C65-8AD6-C043-C3933719C2B0}"/>
+              </a:ext>
+            </a:extLst>
+          </p:cNvPr>
+          <p:cNvCxnSpPr>
+            <a:cxnSpLocks/>
+          </p:cNvCxnSpPr>
+          <p:nvPr/>
+        </p:nvCxnSpPr>
+        <p:spPr>
+          <a:xfrm>
+            <a:off x="-1277598" y="2035177"/>
+            <a:ext cx="324000" cy="0"/>
+          </a:xfrm>
+          <a:prstGeom prst="straightConnector1">
+            <a:avLst/>
+          </a:prstGeom>
+          <a:ln w="28575">
+            <a:solidFill>
+              <a:schemeClr val="tx1"/>
+            </a:solidFill>
+            <a:tailEnd type="triangle"/>
+          </a:ln>
+        </p:spPr>
+        <p:style>
+          <a:lnRef idx="1">
+            <a:schemeClr val="accent1"/>
+          </a:lnRef>
+          <a:fillRef idx="0">
+            <a:schemeClr val="accent1"/>
+          </a:fillRef>
+          <a:effectRef idx="0">
+            <a:schemeClr val="accent1"/>
+          </a:effectRef>
+          <a:fontRef idx="minor">
+            <a:schemeClr val="tx1"/>
+          </a:fontRef>
+        </p:style>
+      </p:cxnSp>
+      <p:cxnSp>
+        <p:nvCxnSpPr>
+          <p:cNvPr id="16" name="Straight Arrow Connector 15">
+            <a:extLst>
+              <a:ext uri="{FF2B5EF4-FFF2-40B4-BE49-F238E27FC236}">
+                <a16:creationId xmlns:a16="http://schemas.microsoft.com/office/drawing/2014/main" id="{9D7074B0-DE5A-7355-1A3E-1FC0329C435E}"/>
+              </a:ext>
+            </a:extLst>
+          </p:cNvPr>
+          <p:cNvCxnSpPr>
+            <a:cxnSpLocks/>
+          </p:cNvCxnSpPr>
+          <p:nvPr/>
+        </p:nvCxnSpPr>
+        <p:spPr>
+          <a:xfrm>
+            <a:off x="-735054" y="2029081"/>
+            <a:ext cx="1404000" cy="0"/>
+          </a:xfrm>
+          <a:prstGeom prst="straightConnector1">
+            <a:avLst/>
+          </a:prstGeom>
+          <a:ln w="28575">
+            <a:solidFill>
+              <a:schemeClr val="tx1"/>
+            </a:solidFill>
+            <a:tailEnd type="triangle"/>
+          </a:ln>
+        </p:spPr>
+        <p:style>
+          <a:lnRef idx="1">
+            <a:schemeClr val="accent1"/>
+          </a:lnRef>
+          <a:fillRef idx="0">
+            <a:schemeClr val="accent1"/>
+          </a:fillRef>
+          <a:effectRef idx="0">
+            <a:schemeClr val="accent1"/>
+          </a:effectRef>
+          <a:fontRef idx="minor">
+            <a:schemeClr val="tx1"/>
+          </a:fontRef>
+        </p:style>
+      </p:cxnSp>
+      <p:cxnSp>
+        <p:nvCxnSpPr>
+          <p:cNvPr id="17" name="Straight Arrow Connector 16">
+            <a:extLst>
+              <a:ext uri="{FF2B5EF4-FFF2-40B4-BE49-F238E27FC236}">
+                <a16:creationId xmlns:a16="http://schemas.microsoft.com/office/drawing/2014/main" id="{6928CA88-0681-9072-B2C7-8B3CC72C889F}"/>
+              </a:ext>
+            </a:extLst>
+          </p:cNvPr>
+          <p:cNvCxnSpPr>
+            <a:cxnSpLocks/>
+          </p:cNvCxnSpPr>
+          <p:nvPr/>
+        </p:nvCxnSpPr>
+        <p:spPr>
+          <a:xfrm>
+            <a:off x="-631422" y="2291209"/>
+            <a:ext cx="1224000" cy="0"/>
+          </a:xfrm>
+          <a:prstGeom prst="straightConnector1">
+            <a:avLst/>
+          </a:prstGeom>
+          <a:ln w="28575">
+            <a:solidFill>
+              <a:schemeClr val="tx1"/>
+            </a:solidFill>
+            <a:tailEnd type="triangle"/>
+          </a:ln>
+        </p:spPr>
+        <p:style>
+          <a:lnRef idx="1">
+            <a:schemeClr val="accent1"/>
+          </a:lnRef>
+          <a:fillRef idx="0">
+            <a:schemeClr val="accent1"/>
+          </a:fillRef>
+          <a:effectRef idx="0">
+            <a:schemeClr val="accent1"/>
+          </a:effectRef>
+          <a:fontRef idx="minor">
+            <a:schemeClr val="tx1"/>
+          </a:fontRef>
+        </p:style>
+      </p:cxnSp>
+      <p:cxnSp>
+        <p:nvCxnSpPr>
+          <p:cNvPr id="18" name="Straight Arrow Connector 17">
+            <a:extLst>
+              <a:ext uri="{FF2B5EF4-FFF2-40B4-BE49-F238E27FC236}">
+                <a16:creationId xmlns:a16="http://schemas.microsoft.com/office/drawing/2014/main" id="{099E8810-ACF5-6EFE-9F8B-EDBD7C7F0623}"/>
+              </a:ext>
+            </a:extLst>
+          </p:cNvPr>
+          <p:cNvCxnSpPr>
+            <a:cxnSpLocks/>
+          </p:cNvCxnSpPr>
+          <p:nvPr/>
+        </p:nvCxnSpPr>
+        <p:spPr>
+          <a:xfrm>
+            <a:off x="-625326" y="2553337"/>
+            <a:ext cx="1224000" cy="0"/>
+          </a:xfrm>
+          <a:prstGeom prst="straightConnector1">
+            <a:avLst/>
+          </a:prstGeom>
+          <a:ln w="28575">
+            <a:solidFill>
+              <a:schemeClr val="tx1"/>
+            </a:solidFill>
+            <a:tailEnd type="triangle"/>
+          </a:ln>
+        </p:spPr>
+        <p:style>
+          <a:lnRef idx="1">
+            <a:schemeClr val="accent1"/>
+          </a:lnRef>
+          <a:fillRef idx="0">
+            <a:schemeClr val="accent1"/>
+          </a:fillRef>
+          <a:effectRef idx="0">
+            <a:schemeClr val="accent1"/>
+          </a:effectRef>
+          <a:fontRef idx="minor">
+            <a:schemeClr val="tx1"/>
+          </a:fontRef>
+        </p:style>
+      </p:cxnSp>
+      <p:cxnSp>
+        <p:nvCxnSpPr>
+          <p:cNvPr id="19" name="Straight Arrow Connector 18">
+            <a:extLst>
+              <a:ext uri="{FF2B5EF4-FFF2-40B4-BE49-F238E27FC236}">
+                <a16:creationId xmlns:a16="http://schemas.microsoft.com/office/drawing/2014/main" id="{328641FC-6FAC-9D33-BC44-921C9C6E560C}"/>
+              </a:ext>
+            </a:extLst>
+          </p:cNvPr>
+          <p:cNvCxnSpPr>
+            <a:cxnSpLocks/>
+          </p:cNvCxnSpPr>
+          <p:nvPr/>
+        </p:nvCxnSpPr>
+        <p:spPr>
+          <a:xfrm flipH="1">
+            <a:off x="-3167550" y="2035177"/>
+            <a:ext cx="546458" cy="0"/>
+          </a:xfrm>
+          <a:prstGeom prst="straightConnector1">
+            <a:avLst/>
+          </a:prstGeom>
+          <a:ln w="28575">
+            <a:solidFill>
+              <a:schemeClr val="tx1"/>
+            </a:solidFill>
+            <a:tailEnd type="triangle"/>
+          </a:ln>
+        </p:spPr>
+        <p:style>
+          <a:lnRef idx="1">
+            <a:schemeClr val="accent1"/>
+          </a:lnRef>
+          <a:fillRef idx="0">
+            <a:schemeClr val="accent1"/>
+          </a:fillRef>
+          <a:effectRef idx="0">
+            <a:schemeClr val="accent1"/>
+          </a:effectRef>
+          <a:fontRef idx="minor">
+            <a:schemeClr val="tx1"/>
+          </a:fontRef>
+        </p:style>
+      </p:cxnSp>
+      <p:cxnSp>
+        <p:nvCxnSpPr>
+          <p:cNvPr id="21" name="Straight Arrow Connector 20">
+            <a:extLst>
+              <a:ext uri="{FF2B5EF4-FFF2-40B4-BE49-F238E27FC236}">
+                <a16:creationId xmlns:a16="http://schemas.microsoft.com/office/drawing/2014/main" id="{5F5648E9-1E13-744A-3E74-808E976908EE}"/>
+              </a:ext>
+            </a:extLst>
+          </p:cNvPr>
+          <p:cNvCxnSpPr>
+            <a:cxnSpLocks/>
+          </p:cNvCxnSpPr>
+          <p:nvPr/>
+        </p:nvCxnSpPr>
+        <p:spPr>
+          <a:xfrm flipH="1">
+            <a:off x="-3027342" y="2297305"/>
+            <a:ext cx="432000" cy="0"/>
+          </a:xfrm>
+          <a:prstGeom prst="straightConnector1">
+            <a:avLst/>
+          </a:prstGeom>
+          <a:ln w="28575">
+            <a:solidFill>
+              <a:schemeClr val="tx1"/>
+            </a:solidFill>
+            <a:tailEnd type="triangle"/>
+          </a:ln>
+        </p:spPr>
+        <p:style>
+          <a:lnRef idx="1">
+            <a:schemeClr val="accent1"/>
+          </a:lnRef>
+          <a:fillRef idx="0">
+            <a:schemeClr val="accent1"/>
+          </a:fillRef>
+          <a:effectRef idx="0">
+            <a:schemeClr val="accent1"/>
+          </a:effectRef>
+          <a:fontRef idx="minor">
+            <a:schemeClr val="tx1"/>
+          </a:fontRef>
+        </p:style>
+      </p:cxnSp>
+      <p:cxnSp>
+        <p:nvCxnSpPr>
+          <p:cNvPr id="23" name="Straight Arrow Connector 22">
+            <a:extLst>
+              <a:ext uri="{FF2B5EF4-FFF2-40B4-BE49-F238E27FC236}">
+                <a16:creationId xmlns:a16="http://schemas.microsoft.com/office/drawing/2014/main" id="{5BE68D6F-7CC2-0E07-4547-B15145248F35}"/>
+              </a:ext>
+            </a:extLst>
+          </p:cNvPr>
+          <p:cNvCxnSpPr>
+            <a:cxnSpLocks/>
+          </p:cNvCxnSpPr>
+          <p:nvPr/>
+        </p:nvCxnSpPr>
+        <p:spPr>
+          <a:xfrm flipH="1">
+            <a:off x="400962" y="2803273"/>
+            <a:ext cx="324000" cy="0"/>
+          </a:xfrm>
+          <a:prstGeom prst="straightConnector1">
+            <a:avLst/>
+          </a:prstGeom>
+          <a:ln w="28575">
+            <a:solidFill>
+              <a:schemeClr val="tx1"/>
+            </a:solidFill>
+            <a:tailEnd type="triangle"/>
+          </a:ln>
+        </p:spPr>
+        <p:style>
+          <a:lnRef idx="1">
+            <a:schemeClr val="accent1"/>
+          </a:lnRef>
+          <a:fillRef idx="0">
+            <a:schemeClr val="accent1"/>
+          </a:fillRef>
+          <a:effectRef idx="0">
+            <a:schemeClr val="accent1"/>
+          </a:effectRef>
+          <a:fontRef idx="minor">
+            <a:schemeClr val="tx1"/>
+          </a:fontRef>
+        </p:style>
+      </p:cxnSp>
+      <p:cxnSp>
+        <p:nvCxnSpPr>
+          <p:cNvPr id="24" name="Straight Arrow Connector 23">
+            <a:extLst>
+              <a:ext uri="{FF2B5EF4-FFF2-40B4-BE49-F238E27FC236}">
+                <a16:creationId xmlns:a16="http://schemas.microsoft.com/office/drawing/2014/main" id="{C2CC38A8-576B-03E9-ADBC-29E144491581}"/>
+              </a:ext>
+            </a:extLst>
+          </p:cNvPr>
+          <p:cNvCxnSpPr>
+            <a:cxnSpLocks/>
+          </p:cNvCxnSpPr>
+          <p:nvPr/>
+        </p:nvCxnSpPr>
+        <p:spPr>
+          <a:xfrm flipH="1">
+            <a:off x="455826" y="3065401"/>
+            <a:ext cx="288000" cy="0"/>
+          </a:xfrm>
+          <a:prstGeom prst="straightConnector1">
+            <a:avLst/>
+          </a:prstGeom>
+          <a:ln w="28575">
+            <a:solidFill>
+              <a:schemeClr val="tx1"/>
+            </a:solidFill>
+            <a:tailEnd type="triangle"/>
+          </a:ln>
+        </p:spPr>
+        <p:style>
+          <a:lnRef idx="1">
+            <a:schemeClr val="accent1"/>
+          </a:lnRef>
+          <a:fillRef idx="0">
+            <a:schemeClr val="accent1"/>
+          </a:fillRef>
+          <a:effectRef idx="0">
+            <a:schemeClr val="accent1"/>
+          </a:effectRef>
+          <a:fontRef idx="minor">
+            <a:schemeClr val="tx1"/>
+          </a:fontRef>
+        </p:style>
+      </p:cxnSp>
+      <p:cxnSp>
+        <p:nvCxnSpPr>
+          <p:cNvPr id="26" name="Straight Connector 25">
+            <a:extLst>
+              <a:ext uri="{FF2B5EF4-FFF2-40B4-BE49-F238E27FC236}">
+                <a16:creationId xmlns:a16="http://schemas.microsoft.com/office/drawing/2014/main" id="{4D8A06BF-D709-09E1-EEC9-227B545CD20D}"/>
+              </a:ext>
+            </a:extLst>
+          </p:cNvPr>
+          <p:cNvCxnSpPr/>
+          <p:nvPr/>
+        </p:nvCxnSpPr>
+        <p:spPr>
+          <a:xfrm>
+            <a:off x="7837187" y="1198550"/>
+            <a:ext cx="0" cy="2016000"/>
+          </a:xfrm>
+          <a:prstGeom prst="line">
+            <a:avLst/>
+          </a:prstGeom>
+          <a:ln w="12700">
+            <a:solidFill>
+              <a:srgbClr val="FF0000"/>
+            </a:solidFill>
+          </a:ln>
+        </p:spPr>
+        <p:style>
+          <a:lnRef idx="1">
+            <a:schemeClr val="accent1"/>
+          </a:lnRef>
+          <a:fillRef idx="0">
+            <a:schemeClr val="accent1"/>
+          </a:fillRef>
+          <a:effectRef idx="0">
+            <a:schemeClr val="accent1"/>
+          </a:effectRef>
+          <a:fontRef idx="minor">
+            <a:schemeClr val="tx1"/>
+          </a:fontRef>
+        </p:style>
+      </p:cxnSp>
+      <p:sp>
+        <p:nvSpPr>
+          <p:cNvPr id="32" name="Rectangle 31">
+            <a:extLst>
+              <a:ext uri="{FF2B5EF4-FFF2-40B4-BE49-F238E27FC236}">
+                <a16:creationId xmlns:a16="http://schemas.microsoft.com/office/drawing/2014/main" id="{41A09211-59FB-6676-B5A6-4D35FF3347C3}"/>
+              </a:ext>
+            </a:extLst>
+          </p:cNvPr>
+          <p:cNvSpPr/>
+          <p:nvPr/>
+        </p:nvSpPr>
+        <p:spPr>
+          <a:xfrm>
+            <a:off x="-6416526" y="1803529"/>
+            <a:ext cx="7172544" cy="1524000"/>
           </a:xfrm>
           <a:prstGeom prst="rect">
             <a:avLst/>
           </a:prstGeom>
-        </p:spPr>
-      </p:pic>
-      <p:sp>
-        <p:nvSpPr>
-          <p:cNvPr id="15" name="Rectangular Callout 14">
-            <a:extLst>
-              <a:ext uri="{FF2B5EF4-FFF2-40B4-BE49-F238E27FC236}">
-                <a16:creationId xmlns:a16="http://schemas.microsoft.com/office/drawing/2014/main" id="{0476EE6A-7D39-6F40-A81F-3B48FCA584CA}"/>
-              </a:ext>
-            </a:extLst>
-          </p:cNvPr>
-          <p:cNvSpPr/>
-          <p:nvPr/>
-        </p:nvSpPr>
-        <p:spPr>
-          <a:xfrm>
-            <a:off x="174358" y="288791"/>
-            <a:ext cx="11778244" cy="3029137"/>
-          </a:xfrm>
-          <a:prstGeom prst="wedgeRectCallout">
-            <a:avLst>
-              <a:gd name="adj1" fmla="val -7177"/>
-              <a:gd name="adj2" fmla="val 66401"/>
-            </a:avLst>
-          </a:prstGeom>
           <a:noFill/>
+          <a:ln>
+            <a:solidFill>
+              <a:schemeClr val="tx1"/>
+            </a:solidFill>
+          </a:ln>
         </p:spPr>
         <p:style>
           <a:lnRef idx="2">
@@ -3839,6 +4635,1588 @@
           <a:p>
             <a:pPr algn="ctr"/>
             <a:endParaRPr lang="en-JP"/>
+          </a:p>
+        </p:txBody>
+      </p:sp>
+      <p:cxnSp>
+        <p:nvCxnSpPr>
+          <p:cNvPr id="34" name="Straight Arrow Connector 33">
+            <a:extLst>
+              <a:ext uri="{FF2B5EF4-FFF2-40B4-BE49-F238E27FC236}">
+                <a16:creationId xmlns:a16="http://schemas.microsoft.com/office/drawing/2014/main" id="{FEE53FB6-EBEC-E70A-9617-0C922EAC951E}"/>
+              </a:ext>
+            </a:extLst>
+          </p:cNvPr>
+          <p:cNvCxnSpPr>
+            <a:cxnSpLocks/>
+          </p:cNvCxnSpPr>
+          <p:nvPr/>
+        </p:nvCxnSpPr>
+        <p:spPr>
+          <a:xfrm flipH="1">
+            <a:off x="5427191" y="3235614"/>
+            <a:ext cx="2409996" cy="624573"/>
+          </a:xfrm>
+          <a:prstGeom prst="straightConnector1">
+            <a:avLst/>
+          </a:prstGeom>
+          <a:ln w="12700">
+            <a:solidFill>
+              <a:srgbClr val="FF0000"/>
+            </a:solidFill>
+            <a:tailEnd type="triangle"/>
+          </a:ln>
+        </p:spPr>
+        <p:style>
+          <a:lnRef idx="1">
+            <a:schemeClr val="accent1"/>
+          </a:lnRef>
+          <a:fillRef idx="0">
+            <a:schemeClr val="accent1"/>
+          </a:fillRef>
+          <a:effectRef idx="0">
+            <a:schemeClr val="accent1"/>
+          </a:effectRef>
+          <a:fontRef idx="minor">
+            <a:schemeClr val="tx1"/>
+          </a:fontRef>
+        </p:style>
+      </p:cxnSp>
+      <p:sp>
+        <p:nvSpPr>
+          <p:cNvPr id="36" name="Rectangle 35">
+            <a:extLst>
+              <a:ext uri="{FF2B5EF4-FFF2-40B4-BE49-F238E27FC236}">
+                <a16:creationId xmlns:a16="http://schemas.microsoft.com/office/drawing/2014/main" id="{00589F47-2E6F-7630-7DFC-D1BCFF0D9F7D}"/>
+              </a:ext>
+            </a:extLst>
+          </p:cNvPr>
+          <p:cNvSpPr/>
+          <p:nvPr/>
+        </p:nvSpPr>
+        <p:spPr>
+          <a:xfrm>
+            <a:off x="2615403" y="1209133"/>
+            <a:ext cx="9095755" cy="2022846"/>
+          </a:xfrm>
+          <a:prstGeom prst="rect">
+            <a:avLst/>
+          </a:prstGeom>
+          <a:noFill/>
+          <a:ln>
+            <a:solidFill>
+              <a:schemeClr val="tx1"/>
+            </a:solidFill>
+          </a:ln>
+        </p:spPr>
+        <p:style>
+          <a:lnRef idx="2">
+            <a:schemeClr val="accent1">
+              <a:shade val="50000"/>
+            </a:schemeClr>
+          </a:lnRef>
+          <a:fillRef idx="1">
+            <a:schemeClr val="accent1"/>
+          </a:fillRef>
+          <a:effectRef idx="0">
+            <a:schemeClr val="accent1"/>
+          </a:effectRef>
+          <a:fontRef idx="minor">
+            <a:schemeClr val="lt1"/>
+          </a:fontRef>
+        </p:style>
+        <p:txBody>
+          <a:bodyPr rtlCol="0" anchor="ctr"/>
+          <a:lstStyle/>
+          <a:p>
+            <a:pPr algn="ctr"/>
+            <a:endParaRPr lang="en-JP"/>
+          </a:p>
+        </p:txBody>
+      </p:sp>
+      <p:cxnSp>
+        <p:nvCxnSpPr>
+          <p:cNvPr id="37" name="Straight Arrow Connector 36">
+            <a:extLst>
+              <a:ext uri="{FF2B5EF4-FFF2-40B4-BE49-F238E27FC236}">
+                <a16:creationId xmlns:a16="http://schemas.microsoft.com/office/drawing/2014/main" id="{1BBAADB0-1471-6984-B556-2D1F4860E805}"/>
+              </a:ext>
+            </a:extLst>
+          </p:cNvPr>
+          <p:cNvCxnSpPr/>
+          <p:nvPr/>
+        </p:nvCxnSpPr>
+        <p:spPr>
+          <a:xfrm flipH="1">
+            <a:off x="3387819" y="2219226"/>
+            <a:ext cx="1980000" cy="0"/>
+          </a:xfrm>
+          <a:prstGeom prst="straightConnector1">
+            <a:avLst/>
+          </a:prstGeom>
+          <a:ln w="28575">
+            <a:solidFill>
+              <a:schemeClr val="tx1"/>
+            </a:solidFill>
+            <a:tailEnd type="triangle"/>
+          </a:ln>
+        </p:spPr>
+        <p:style>
+          <a:lnRef idx="1">
+            <a:schemeClr val="accent1"/>
+          </a:lnRef>
+          <a:fillRef idx="0">
+            <a:schemeClr val="accent1"/>
+          </a:fillRef>
+          <a:effectRef idx="0">
+            <a:schemeClr val="accent1"/>
+          </a:effectRef>
+          <a:fontRef idx="minor">
+            <a:schemeClr val="tx1"/>
+          </a:fontRef>
+        </p:style>
+      </p:cxnSp>
+      <p:cxnSp>
+        <p:nvCxnSpPr>
+          <p:cNvPr id="38" name="Straight Arrow Connector 37">
+            <a:extLst>
+              <a:ext uri="{FF2B5EF4-FFF2-40B4-BE49-F238E27FC236}">
+                <a16:creationId xmlns:a16="http://schemas.microsoft.com/office/drawing/2014/main" id="{5F5BFAAC-E4D4-4310-4487-CC271EC89F78}"/>
+              </a:ext>
+            </a:extLst>
+          </p:cNvPr>
+          <p:cNvCxnSpPr>
+            <a:cxnSpLocks/>
+          </p:cNvCxnSpPr>
+          <p:nvPr/>
+        </p:nvCxnSpPr>
+        <p:spPr>
+          <a:xfrm>
+            <a:off x="5590029" y="1565254"/>
+            <a:ext cx="864000" cy="0"/>
+          </a:xfrm>
+          <a:prstGeom prst="straightConnector1">
+            <a:avLst/>
+          </a:prstGeom>
+          <a:ln w="28575">
+            <a:solidFill>
+              <a:schemeClr val="tx1"/>
+            </a:solidFill>
+            <a:tailEnd type="triangle"/>
+          </a:ln>
+        </p:spPr>
+        <p:style>
+          <a:lnRef idx="1">
+            <a:schemeClr val="accent1"/>
+          </a:lnRef>
+          <a:fillRef idx="0">
+            <a:schemeClr val="accent1"/>
+          </a:fillRef>
+          <a:effectRef idx="0">
+            <a:schemeClr val="accent1"/>
+          </a:effectRef>
+          <a:fontRef idx="minor">
+            <a:schemeClr val="tx1"/>
+          </a:fontRef>
+        </p:style>
+      </p:cxnSp>
+      <p:cxnSp>
+        <p:nvCxnSpPr>
+          <p:cNvPr id="42" name="Straight Connector 41">
+            <a:extLst>
+              <a:ext uri="{FF2B5EF4-FFF2-40B4-BE49-F238E27FC236}">
+                <a16:creationId xmlns:a16="http://schemas.microsoft.com/office/drawing/2014/main" id="{ECBBE84E-C304-4333-5CC9-9A0E77523724}"/>
+              </a:ext>
+            </a:extLst>
+          </p:cNvPr>
+          <p:cNvCxnSpPr/>
+          <p:nvPr/>
+        </p:nvCxnSpPr>
+        <p:spPr>
+          <a:xfrm flipH="1">
+            <a:off x="2629691" y="1565254"/>
+            <a:ext cx="864000" cy="0"/>
+          </a:xfrm>
+          <a:prstGeom prst="line">
+            <a:avLst/>
+          </a:prstGeom>
+          <a:ln w="28575">
+            <a:solidFill>
+              <a:schemeClr val="tx1"/>
+            </a:solidFill>
+          </a:ln>
+        </p:spPr>
+        <p:style>
+          <a:lnRef idx="1">
+            <a:schemeClr val="accent1"/>
+          </a:lnRef>
+          <a:fillRef idx="0">
+            <a:schemeClr val="accent1"/>
+          </a:fillRef>
+          <a:effectRef idx="0">
+            <a:schemeClr val="accent1"/>
+          </a:effectRef>
+          <a:fontRef idx="minor">
+            <a:schemeClr val="tx1"/>
+          </a:fontRef>
+        </p:style>
+      </p:cxnSp>
+      <p:cxnSp>
+        <p:nvCxnSpPr>
+          <p:cNvPr id="43" name="Straight Arrow Connector 42">
+            <a:extLst>
+              <a:ext uri="{FF2B5EF4-FFF2-40B4-BE49-F238E27FC236}">
+                <a16:creationId xmlns:a16="http://schemas.microsoft.com/office/drawing/2014/main" id="{5411F6EA-BD80-6837-6185-952F42BF7EEB}"/>
+              </a:ext>
+            </a:extLst>
+          </p:cNvPr>
+          <p:cNvCxnSpPr>
+            <a:cxnSpLocks/>
+          </p:cNvCxnSpPr>
+          <p:nvPr/>
+        </p:nvCxnSpPr>
+        <p:spPr>
+          <a:xfrm>
+            <a:off x="9857488" y="1574588"/>
+            <a:ext cx="1728000" cy="0"/>
+          </a:xfrm>
+          <a:prstGeom prst="straightConnector1">
+            <a:avLst/>
+          </a:prstGeom>
+          <a:ln w="28575">
+            <a:solidFill>
+              <a:schemeClr val="tx1"/>
+            </a:solidFill>
+            <a:tailEnd type="triangle"/>
+          </a:ln>
+        </p:spPr>
+        <p:style>
+          <a:lnRef idx="1">
+            <a:schemeClr val="accent1"/>
+          </a:lnRef>
+          <a:fillRef idx="0">
+            <a:schemeClr val="accent1"/>
+          </a:fillRef>
+          <a:effectRef idx="0">
+            <a:schemeClr val="accent1"/>
+          </a:effectRef>
+          <a:fontRef idx="minor">
+            <a:schemeClr val="tx1"/>
+          </a:fontRef>
+        </p:style>
+      </p:cxnSp>
+      <p:cxnSp>
+        <p:nvCxnSpPr>
+          <p:cNvPr id="44" name="Straight Arrow Connector 43">
+            <a:extLst>
+              <a:ext uri="{FF2B5EF4-FFF2-40B4-BE49-F238E27FC236}">
+                <a16:creationId xmlns:a16="http://schemas.microsoft.com/office/drawing/2014/main" id="{B48E9D9E-DF34-7EDC-6BE3-FBC8B0B6F616}"/>
+              </a:ext>
+            </a:extLst>
+          </p:cNvPr>
+          <p:cNvCxnSpPr>
+            <a:cxnSpLocks/>
+          </p:cNvCxnSpPr>
+          <p:nvPr/>
+        </p:nvCxnSpPr>
+        <p:spPr>
+          <a:xfrm>
+            <a:off x="9967024" y="1898442"/>
+            <a:ext cx="1548000" cy="0"/>
+          </a:xfrm>
+          <a:prstGeom prst="straightConnector1">
+            <a:avLst/>
+          </a:prstGeom>
+          <a:ln w="28575">
+            <a:solidFill>
+              <a:schemeClr val="tx1"/>
+            </a:solidFill>
+            <a:tailEnd type="triangle"/>
+          </a:ln>
+        </p:spPr>
+        <p:style>
+          <a:lnRef idx="1">
+            <a:schemeClr val="accent1"/>
+          </a:lnRef>
+          <a:fillRef idx="0">
+            <a:schemeClr val="accent1"/>
+          </a:fillRef>
+          <a:effectRef idx="0">
+            <a:schemeClr val="accent1"/>
+          </a:effectRef>
+          <a:fontRef idx="minor">
+            <a:schemeClr val="tx1"/>
+          </a:fontRef>
+        </p:style>
+      </p:cxnSp>
+      <p:cxnSp>
+        <p:nvCxnSpPr>
+          <p:cNvPr id="45" name="Straight Arrow Connector 44">
+            <a:extLst>
+              <a:ext uri="{FF2B5EF4-FFF2-40B4-BE49-F238E27FC236}">
+                <a16:creationId xmlns:a16="http://schemas.microsoft.com/office/drawing/2014/main" id="{4B8EED6D-0516-DA37-A105-B5E10B2494B1}"/>
+              </a:ext>
+            </a:extLst>
+          </p:cNvPr>
+          <p:cNvCxnSpPr>
+            <a:cxnSpLocks/>
+          </p:cNvCxnSpPr>
+          <p:nvPr/>
+        </p:nvCxnSpPr>
+        <p:spPr>
+          <a:xfrm>
+            <a:off x="9976545" y="2222295"/>
+            <a:ext cx="1548000" cy="0"/>
+          </a:xfrm>
+          <a:prstGeom prst="straightConnector1">
+            <a:avLst/>
+          </a:prstGeom>
+          <a:ln w="28575">
+            <a:solidFill>
+              <a:schemeClr val="tx1"/>
+            </a:solidFill>
+            <a:tailEnd type="triangle"/>
+          </a:ln>
+        </p:spPr>
+        <p:style>
+          <a:lnRef idx="1">
+            <a:schemeClr val="accent1"/>
+          </a:lnRef>
+          <a:fillRef idx="0">
+            <a:schemeClr val="accent1"/>
+          </a:fillRef>
+          <a:effectRef idx="0">
+            <a:schemeClr val="accent1"/>
+          </a:effectRef>
+          <a:fontRef idx="minor">
+            <a:schemeClr val="tx1"/>
+          </a:fontRef>
+        </p:style>
+      </p:cxnSp>
+      <p:cxnSp>
+        <p:nvCxnSpPr>
+          <p:cNvPr id="46" name="Straight Arrow Connector 45">
+            <a:extLst>
+              <a:ext uri="{FF2B5EF4-FFF2-40B4-BE49-F238E27FC236}">
+                <a16:creationId xmlns:a16="http://schemas.microsoft.com/office/drawing/2014/main" id="{0F4FD263-9198-ABB4-9595-5FD3050ACC96}"/>
+              </a:ext>
+            </a:extLst>
+          </p:cNvPr>
+          <p:cNvCxnSpPr>
+            <a:cxnSpLocks/>
+          </p:cNvCxnSpPr>
+          <p:nvPr/>
+        </p:nvCxnSpPr>
+        <p:spPr>
+          <a:xfrm>
+            <a:off x="9131425" y="1561444"/>
+            <a:ext cx="432000" cy="0"/>
+          </a:xfrm>
+          <a:prstGeom prst="straightConnector1">
+            <a:avLst/>
+          </a:prstGeom>
+          <a:ln w="28575">
+            <a:solidFill>
+              <a:srgbClr val="FF0000"/>
+            </a:solidFill>
+            <a:tailEnd type="triangle"/>
+          </a:ln>
+        </p:spPr>
+        <p:style>
+          <a:lnRef idx="1">
+            <a:schemeClr val="accent1"/>
+          </a:lnRef>
+          <a:fillRef idx="0">
+            <a:schemeClr val="accent1"/>
+          </a:fillRef>
+          <a:effectRef idx="0">
+            <a:schemeClr val="accent1"/>
+          </a:effectRef>
+          <a:fontRef idx="minor">
+            <a:schemeClr val="tx1"/>
+          </a:fontRef>
+        </p:style>
+      </p:cxnSp>
+      <p:cxnSp>
+        <p:nvCxnSpPr>
+          <p:cNvPr id="47" name="Straight Arrow Connector 46">
+            <a:extLst>
+              <a:ext uri="{FF2B5EF4-FFF2-40B4-BE49-F238E27FC236}">
+                <a16:creationId xmlns:a16="http://schemas.microsoft.com/office/drawing/2014/main" id="{CF2B4F2C-17BD-E31C-0DE6-070FE33FEC5D}"/>
+              </a:ext>
+            </a:extLst>
+          </p:cNvPr>
+          <p:cNvCxnSpPr>
+            <a:cxnSpLocks/>
+          </p:cNvCxnSpPr>
+          <p:nvPr/>
+        </p:nvCxnSpPr>
+        <p:spPr>
+          <a:xfrm flipH="1">
+            <a:off x="6792570" y="1561442"/>
+            <a:ext cx="648000" cy="0"/>
+          </a:xfrm>
+          <a:prstGeom prst="straightConnector1">
+            <a:avLst/>
+          </a:prstGeom>
+          <a:ln w="28575">
+            <a:solidFill>
+              <a:srgbClr val="FF0000"/>
+            </a:solidFill>
+            <a:tailEnd type="triangle"/>
+          </a:ln>
+        </p:spPr>
+        <p:style>
+          <a:lnRef idx="1">
+            <a:schemeClr val="accent1"/>
+          </a:lnRef>
+          <a:fillRef idx="0">
+            <a:schemeClr val="accent1"/>
+          </a:fillRef>
+          <a:effectRef idx="0">
+            <a:schemeClr val="accent1"/>
+          </a:effectRef>
+          <a:fontRef idx="minor">
+            <a:schemeClr val="tx1"/>
+          </a:fontRef>
+        </p:style>
+      </p:cxnSp>
+      <p:cxnSp>
+        <p:nvCxnSpPr>
+          <p:cNvPr id="48" name="Straight Arrow Connector 47">
+            <a:extLst>
+              <a:ext uri="{FF2B5EF4-FFF2-40B4-BE49-F238E27FC236}">
+                <a16:creationId xmlns:a16="http://schemas.microsoft.com/office/drawing/2014/main" id="{4B1345F2-66F5-5E74-EE93-47039CAD1FEE}"/>
+              </a:ext>
+            </a:extLst>
+          </p:cNvPr>
+          <p:cNvCxnSpPr>
+            <a:cxnSpLocks/>
+          </p:cNvCxnSpPr>
+          <p:nvPr/>
+        </p:nvCxnSpPr>
+        <p:spPr>
+          <a:xfrm flipH="1">
+            <a:off x="6959258" y="1899583"/>
+            <a:ext cx="504000" cy="0"/>
+          </a:xfrm>
+          <a:prstGeom prst="straightConnector1">
+            <a:avLst/>
+          </a:prstGeom>
+          <a:ln w="28575">
+            <a:solidFill>
+              <a:srgbClr val="FF0000"/>
+            </a:solidFill>
+            <a:tailEnd type="triangle"/>
+          </a:ln>
+        </p:spPr>
+        <p:style>
+          <a:lnRef idx="1">
+            <a:schemeClr val="accent1"/>
+          </a:lnRef>
+          <a:fillRef idx="0">
+            <a:schemeClr val="accent1"/>
+          </a:fillRef>
+          <a:effectRef idx="0">
+            <a:schemeClr val="accent1"/>
+          </a:effectRef>
+          <a:fontRef idx="minor">
+            <a:schemeClr val="tx1"/>
+          </a:fontRef>
+        </p:style>
+      </p:cxnSp>
+      <p:cxnSp>
+        <p:nvCxnSpPr>
+          <p:cNvPr id="49" name="Straight Arrow Connector 48">
+            <a:extLst>
+              <a:ext uri="{FF2B5EF4-FFF2-40B4-BE49-F238E27FC236}">
+                <a16:creationId xmlns:a16="http://schemas.microsoft.com/office/drawing/2014/main" id="{0BFC9CC3-80F4-3F49-82AA-E5DC04C9B528}"/>
+              </a:ext>
+            </a:extLst>
+          </p:cNvPr>
+          <p:cNvCxnSpPr>
+            <a:cxnSpLocks/>
+          </p:cNvCxnSpPr>
+          <p:nvPr/>
+        </p:nvCxnSpPr>
+        <p:spPr>
+          <a:xfrm>
+            <a:off x="6358625" y="1896706"/>
+            <a:ext cx="612000" cy="0"/>
+          </a:xfrm>
+          <a:prstGeom prst="straightConnector1">
+            <a:avLst/>
+          </a:prstGeom>
+          <a:ln w="28575">
+            <a:solidFill>
+              <a:srgbClr val="FF0000"/>
+            </a:solidFill>
+            <a:tailEnd type="triangle"/>
+          </a:ln>
+        </p:spPr>
+        <p:style>
+          <a:lnRef idx="1">
+            <a:schemeClr val="accent1"/>
+          </a:lnRef>
+          <a:fillRef idx="0">
+            <a:schemeClr val="accent1"/>
+          </a:fillRef>
+          <a:effectRef idx="0">
+            <a:schemeClr val="accent1"/>
+          </a:effectRef>
+          <a:fontRef idx="minor">
+            <a:schemeClr val="tx1"/>
+          </a:fontRef>
+        </p:style>
+      </p:cxnSp>
+      <p:cxnSp>
+        <p:nvCxnSpPr>
+          <p:cNvPr id="50" name="Straight Arrow Connector 49">
+            <a:extLst>
+              <a:ext uri="{FF2B5EF4-FFF2-40B4-BE49-F238E27FC236}">
+                <a16:creationId xmlns:a16="http://schemas.microsoft.com/office/drawing/2014/main" id="{0ADEB4A4-7F78-C82F-0E96-8828E0CB060B}"/>
+              </a:ext>
+            </a:extLst>
+          </p:cNvPr>
+          <p:cNvCxnSpPr>
+            <a:cxnSpLocks/>
+          </p:cNvCxnSpPr>
+          <p:nvPr/>
+        </p:nvCxnSpPr>
+        <p:spPr>
+          <a:xfrm>
+            <a:off x="6339573" y="2220560"/>
+            <a:ext cx="612000" cy="0"/>
+          </a:xfrm>
+          <a:prstGeom prst="straightConnector1">
+            <a:avLst/>
+          </a:prstGeom>
+          <a:ln w="28575">
+            <a:solidFill>
+              <a:srgbClr val="FF0000"/>
+            </a:solidFill>
+            <a:tailEnd type="triangle"/>
+          </a:ln>
+        </p:spPr>
+        <p:style>
+          <a:lnRef idx="1">
+            <a:schemeClr val="accent1"/>
+          </a:lnRef>
+          <a:fillRef idx="0">
+            <a:schemeClr val="accent1"/>
+          </a:fillRef>
+          <a:effectRef idx="0">
+            <a:schemeClr val="accent1"/>
+          </a:effectRef>
+          <a:fontRef idx="minor">
+            <a:schemeClr val="tx1"/>
+          </a:fontRef>
+        </p:style>
+      </p:cxnSp>
+      <p:cxnSp>
+        <p:nvCxnSpPr>
+          <p:cNvPr id="52" name="Straight Arrow Connector 51">
+            <a:extLst>
+              <a:ext uri="{FF2B5EF4-FFF2-40B4-BE49-F238E27FC236}">
+                <a16:creationId xmlns:a16="http://schemas.microsoft.com/office/drawing/2014/main" id="{10970293-184B-54EB-5F2C-6A0EC19C1D08}"/>
+              </a:ext>
+            </a:extLst>
+          </p:cNvPr>
+          <p:cNvCxnSpPr>
+            <a:cxnSpLocks/>
+          </p:cNvCxnSpPr>
+          <p:nvPr/>
+        </p:nvCxnSpPr>
+        <p:spPr>
+          <a:xfrm flipH="1">
+            <a:off x="11275776" y="2555188"/>
+            <a:ext cx="432000" cy="0"/>
+          </a:xfrm>
+          <a:prstGeom prst="straightConnector1">
+            <a:avLst/>
+          </a:prstGeom>
+          <a:ln w="28575">
+            <a:solidFill>
+              <a:schemeClr val="tx1"/>
+            </a:solidFill>
+            <a:tailEnd type="triangle"/>
+          </a:ln>
+        </p:spPr>
+        <p:style>
+          <a:lnRef idx="1">
+            <a:schemeClr val="accent1"/>
+          </a:lnRef>
+          <a:fillRef idx="0">
+            <a:schemeClr val="accent1"/>
+          </a:fillRef>
+          <a:effectRef idx="0">
+            <a:schemeClr val="accent1"/>
+          </a:effectRef>
+          <a:fontRef idx="minor">
+            <a:schemeClr val="tx1"/>
+          </a:fontRef>
+        </p:style>
+      </p:cxnSp>
+      <p:cxnSp>
+        <p:nvCxnSpPr>
+          <p:cNvPr id="53" name="Straight Arrow Connector 52">
+            <a:extLst>
+              <a:ext uri="{FF2B5EF4-FFF2-40B4-BE49-F238E27FC236}">
+                <a16:creationId xmlns:a16="http://schemas.microsoft.com/office/drawing/2014/main" id="{94C3BA40-0EEB-3BCF-91FF-539DA1E7EA92}"/>
+              </a:ext>
+            </a:extLst>
+          </p:cNvPr>
+          <p:cNvCxnSpPr>
+            <a:cxnSpLocks/>
+          </p:cNvCxnSpPr>
+          <p:nvPr/>
+        </p:nvCxnSpPr>
+        <p:spPr>
+          <a:xfrm flipH="1">
+            <a:off x="11385312" y="2879042"/>
+            <a:ext cx="324000" cy="0"/>
+          </a:xfrm>
+          <a:prstGeom prst="straightConnector1">
+            <a:avLst/>
+          </a:prstGeom>
+          <a:ln w="28575">
+            <a:solidFill>
+              <a:schemeClr val="tx1"/>
+            </a:solidFill>
+            <a:tailEnd type="triangle"/>
+          </a:ln>
+        </p:spPr>
+        <p:style>
+          <a:lnRef idx="1">
+            <a:schemeClr val="accent1"/>
+          </a:lnRef>
+          <a:fillRef idx="0">
+            <a:schemeClr val="accent1"/>
+          </a:fillRef>
+          <a:effectRef idx="0">
+            <a:schemeClr val="accent1"/>
+          </a:effectRef>
+          <a:fontRef idx="minor">
+            <a:schemeClr val="tx1"/>
+          </a:fontRef>
+        </p:style>
+      </p:cxnSp>
+      <p:sp>
+        <p:nvSpPr>
+          <p:cNvPr id="54" name="TextBox 53">
+            <a:extLst>
+              <a:ext uri="{FF2B5EF4-FFF2-40B4-BE49-F238E27FC236}">
+                <a16:creationId xmlns:a16="http://schemas.microsoft.com/office/drawing/2014/main" id="{CBB7C0B6-E503-EB2C-7AF2-D987D31141D6}"/>
+              </a:ext>
+            </a:extLst>
+          </p:cNvPr>
+          <p:cNvSpPr txBox="1"/>
+          <p:nvPr/>
+        </p:nvSpPr>
+        <p:spPr>
+          <a:xfrm>
+            <a:off x="2516313" y="3227769"/>
+            <a:ext cx="8080867" cy="276999"/>
+          </a:xfrm>
+          <a:prstGeom prst="rect">
+            <a:avLst/>
+          </a:prstGeom>
+          <a:noFill/>
+        </p:spPr>
+        <p:txBody>
+          <a:bodyPr wrap="none" rtlCol="0">
+            <a:spAutoFit/>
+          </a:bodyPr>
+          <a:lstStyle/>
+          <a:p>
+            <a:r>
+              <a:rPr lang="en-JP" sz="1200" dirty="0">
+                <a:latin typeface="Arial" panose="020B0604020202020204" pitchFamily="34" charset="0"/>
+                <a:cs typeface="Arial" panose="020B0604020202020204" pitchFamily="34" charset="0"/>
+              </a:rPr>
+              <a:t>4562454                            4568284                             4574114                             4579943                             4585773</a:t>
+            </a:r>
+          </a:p>
+        </p:txBody>
+      </p:sp>
+      <p:cxnSp>
+        <p:nvCxnSpPr>
+          <p:cNvPr id="57" name="Straight Connector 56">
+            <a:extLst>
+              <a:ext uri="{FF2B5EF4-FFF2-40B4-BE49-F238E27FC236}">
+                <a16:creationId xmlns:a16="http://schemas.microsoft.com/office/drawing/2014/main" id="{D5D35D4A-5A36-639E-F4FE-1B2FB3BF34E0}"/>
+              </a:ext>
+            </a:extLst>
+          </p:cNvPr>
+          <p:cNvCxnSpPr/>
+          <p:nvPr/>
+        </p:nvCxnSpPr>
+        <p:spPr>
+          <a:xfrm>
+            <a:off x="9869238" y="1198928"/>
+            <a:ext cx="0" cy="2016000"/>
+          </a:xfrm>
+          <a:prstGeom prst="line">
+            <a:avLst/>
+          </a:prstGeom>
+          <a:ln>
+            <a:solidFill>
+              <a:schemeClr val="bg1">
+                <a:lumMod val="50000"/>
+              </a:schemeClr>
+            </a:solidFill>
+            <a:prstDash val="dash"/>
+          </a:ln>
+        </p:spPr>
+        <p:style>
+          <a:lnRef idx="1">
+            <a:schemeClr val="accent1"/>
+          </a:lnRef>
+          <a:fillRef idx="0">
+            <a:schemeClr val="accent1"/>
+          </a:fillRef>
+          <a:effectRef idx="0">
+            <a:schemeClr val="accent1"/>
+          </a:effectRef>
+          <a:fontRef idx="minor">
+            <a:schemeClr val="tx1"/>
+          </a:fontRef>
+        </p:style>
+      </p:cxnSp>
+      <p:cxnSp>
+        <p:nvCxnSpPr>
+          <p:cNvPr id="58" name="Straight Connector 57">
+            <a:extLst>
+              <a:ext uri="{FF2B5EF4-FFF2-40B4-BE49-F238E27FC236}">
+                <a16:creationId xmlns:a16="http://schemas.microsoft.com/office/drawing/2014/main" id="{EA966E42-9474-A508-8EBC-BFA883A29759}"/>
+              </a:ext>
+            </a:extLst>
+          </p:cNvPr>
+          <p:cNvCxnSpPr/>
+          <p:nvPr/>
+        </p:nvCxnSpPr>
+        <p:spPr>
+          <a:xfrm>
+            <a:off x="8049964" y="1194845"/>
+            <a:ext cx="0" cy="2016000"/>
+          </a:xfrm>
+          <a:prstGeom prst="line">
+            <a:avLst/>
+          </a:prstGeom>
+          <a:ln>
+            <a:solidFill>
+              <a:schemeClr val="bg1">
+                <a:lumMod val="50000"/>
+              </a:schemeClr>
+            </a:solidFill>
+            <a:prstDash val="dash"/>
+          </a:ln>
+        </p:spPr>
+        <p:style>
+          <a:lnRef idx="1">
+            <a:schemeClr val="accent1"/>
+          </a:lnRef>
+          <a:fillRef idx="0">
+            <a:schemeClr val="accent1"/>
+          </a:fillRef>
+          <a:effectRef idx="0">
+            <a:schemeClr val="accent1"/>
+          </a:effectRef>
+          <a:fontRef idx="minor">
+            <a:schemeClr val="tx1"/>
+          </a:fontRef>
+        </p:style>
+      </p:cxnSp>
+      <p:cxnSp>
+        <p:nvCxnSpPr>
+          <p:cNvPr id="59" name="Straight Connector 58">
+            <a:extLst>
+              <a:ext uri="{FF2B5EF4-FFF2-40B4-BE49-F238E27FC236}">
+                <a16:creationId xmlns:a16="http://schemas.microsoft.com/office/drawing/2014/main" id="{98772DBF-EB99-18C0-F476-F36990138489}"/>
+              </a:ext>
+            </a:extLst>
+          </p:cNvPr>
+          <p:cNvCxnSpPr/>
+          <p:nvPr/>
+        </p:nvCxnSpPr>
+        <p:spPr>
+          <a:xfrm>
+            <a:off x="6247451" y="1201691"/>
+            <a:ext cx="0" cy="2016000"/>
+          </a:xfrm>
+          <a:prstGeom prst="line">
+            <a:avLst/>
+          </a:prstGeom>
+          <a:ln>
+            <a:solidFill>
+              <a:schemeClr val="bg1">
+                <a:lumMod val="50000"/>
+              </a:schemeClr>
+            </a:solidFill>
+            <a:prstDash val="dash"/>
+          </a:ln>
+        </p:spPr>
+        <p:style>
+          <a:lnRef idx="1">
+            <a:schemeClr val="accent1"/>
+          </a:lnRef>
+          <a:fillRef idx="0">
+            <a:schemeClr val="accent1"/>
+          </a:fillRef>
+          <a:effectRef idx="0">
+            <a:schemeClr val="accent1"/>
+          </a:effectRef>
+          <a:fontRef idx="minor">
+            <a:schemeClr val="tx1"/>
+          </a:fontRef>
+        </p:style>
+      </p:cxnSp>
+      <p:cxnSp>
+        <p:nvCxnSpPr>
+          <p:cNvPr id="60" name="Straight Connector 59">
+            <a:extLst>
+              <a:ext uri="{FF2B5EF4-FFF2-40B4-BE49-F238E27FC236}">
+                <a16:creationId xmlns:a16="http://schemas.microsoft.com/office/drawing/2014/main" id="{29F0197C-0277-94CA-6AF6-A3B605139A81}"/>
+              </a:ext>
+            </a:extLst>
+          </p:cNvPr>
+          <p:cNvCxnSpPr/>
+          <p:nvPr/>
+        </p:nvCxnSpPr>
+        <p:spPr>
+          <a:xfrm>
+            <a:off x="4430938" y="1194845"/>
+            <a:ext cx="0" cy="2016000"/>
+          </a:xfrm>
+          <a:prstGeom prst="line">
+            <a:avLst/>
+          </a:prstGeom>
+          <a:ln>
+            <a:solidFill>
+              <a:schemeClr val="bg1">
+                <a:lumMod val="50000"/>
+              </a:schemeClr>
+            </a:solidFill>
+            <a:prstDash val="dash"/>
+          </a:ln>
+        </p:spPr>
+        <p:style>
+          <a:lnRef idx="1">
+            <a:schemeClr val="accent1"/>
+          </a:lnRef>
+          <a:fillRef idx="0">
+            <a:schemeClr val="accent1"/>
+          </a:fillRef>
+          <a:effectRef idx="0">
+            <a:schemeClr val="accent1"/>
+          </a:effectRef>
+          <a:fontRef idx="minor">
+            <a:schemeClr val="tx1"/>
+          </a:fontRef>
+        </p:style>
+      </p:cxnSp>
+      <p:sp>
+        <p:nvSpPr>
+          <p:cNvPr id="61" name="TextBox 60">
+            <a:extLst>
+              <a:ext uri="{FF2B5EF4-FFF2-40B4-BE49-F238E27FC236}">
+                <a16:creationId xmlns:a16="http://schemas.microsoft.com/office/drawing/2014/main" id="{7F2FF8A9-B298-D7AD-13F1-4B6D4D87C828}"/>
+              </a:ext>
+            </a:extLst>
+          </p:cNvPr>
+          <p:cNvSpPr txBox="1"/>
+          <p:nvPr/>
+        </p:nvSpPr>
+        <p:spPr>
+          <a:xfrm>
+            <a:off x="3405539" y="1922836"/>
+            <a:ext cx="1128642" cy="276999"/>
+          </a:xfrm>
+          <a:prstGeom prst="rect">
+            <a:avLst/>
+          </a:prstGeom>
+          <a:noFill/>
+        </p:spPr>
+        <p:txBody>
+          <a:bodyPr wrap="none" rtlCol="0">
+            <a:spAutoFit/>
+          </a:bodyPr>
+          <a:lstStyle/>
+          <a:p>
+            <a:r>
+              <a:rPr lang="en-JP" sz="1200" dirty="0">
+                <a:latin typeface="Arial" panose="020B0604020202020204" pitchFamily="34" charset="0"/>
+                <a:cs typeface="Arial" panose="020B0604020202020204" pitchFamily="34" charset="0"/>
+              </a:rPr>
+              <a:t>AT3G13870.1</a:t>
+            </a:r>
+          </a:p>
+        </p:txBody>
+      </p:sp>
+      <p:sp>
+        <p:nvSpPr>
+          <p:cNvPr id="62" name="TextBox 61">
+            <a:extLst>
+              <a:ext uri="{FF2B5EF4-FFF2-40B4-BE49-F238E27FC236}">
+                <a16:creationId xmlns:a16="http://schemas.microsoft.com/office/drawing/2014/main" id="{2AD16C8A-392F-C031-DCA2-8DAF96588F20}"/>
+              </a:ext>
+            </a:extLst>
+          </p:cNvPr>
+          <p:cNvSpPr txBox="1"/>
+          <p:nvPr/>
+        </p:nvSpPr>
+        <p:spPr>
+          <a:xfrm>
+            <a:off x="3415061" y="2275264"/>
+            <a:ext cx="1128642" cy="276999"/>
+          </a:xfrm>
+          <a:prstGeom prst="rect">
+            <a:avLst/>
+          </a:prstGeom>
+          <a:noFill/>
+        </p:spPr>
+        <p:txBody>
+          <a:bodyPr wrap="none" rtlCol="0">
+            <a:spAutoFit/>
+          </a:bodyPr>
+          <a:lstStyle/>
+          <a:p>
+            <a:r>
+              <a:rPr lang="en-JP" sz="1200" dirty="0">
+                <a:latin typeface="Arial" panose="020B0604020202020204" pitchFamily="34" charset="0"/>
+                <a:cs typeface="Arial" panose="020B0604020202020204" pitchFamily="34" charset="0"/>
+              </a:rPr>
+              <a:t>AT3G13870.2</a:t>
+            </a:r>
+          </a:p>
+        </p:txBody>
+      </p:sp>
+      <p:sp>
+        <p:nvSpPr>
+          <p:cNvPr id="63" name="TextBox 62">
+            <a:extLst>
+              <a:ext uri="{FF2B5EF4-FFF2-40B4-BE49-F238E27FC236}">
+                <a16:creationId xmlns:a16="http://schemas.microsoft.com/office/drawing/2014/main" id="{CCC145BE-7B52-A81D-A68A-7F95F11B5BAB}"/>
+              </a:ext>
+            </a:extLst>
+          </p:cNvPr>
+          <p:cNvSpPr txBox="1"/>
+          <p:nvPr/>
+        </p:nvSpPr>
+        <p:spPr>
+          <a:xfrm>
+            <a:off x="4498348" y="1557466"/>
+            <a:ext cx="601447" cy="276999"/>
+          </a:xfrm>
+          <a:prstGeom prst="rect">
+            <a:avLst/>
+          </a:prstGeom>
+          <a:noFill/>
+        </p:spPr>
+        <p:txBody>
+          <a:bodyPr wrap="none" rtlCol="0">
+            <a:spAutoFit/>
+          </a:bodyPr>
+          <a:lstStyle/>
+          <a:p>
+            <a:r>
+              <a:rPr lang="en-JP" sz="1200" b="1" i="1" dirty="0">
+                <a:latin typeface="Arial" panose="020B0604020202020204" pitchFamily="34" charset="0"/>
+                <a:cs typeface="Arial" panose="020B0604020202020204" pitchFamily="34" charset="0"/>
+              </a:rPr>
+              <a:t>RHD3</a:t>
+            </a:r>
+          </a:p>
+        </p:txBody>
+      </p:sp>
+      <p:sp>
+        <p:nvSpPr>
+          <p:cNvPr id="64" name="TextBox 63">
+            <a:extLst>
+              <a:ext uri="{FF2B5EF4-FFF2-40B4-BE49-F238E27FC236}">
+                <a16:creationId xmlns:a16="http://schemas.microsoft.com/office/drawing/2014/main" id="{84C7D681-C99B-335D-1C05-1A479DC3ADC2}"/>
+              </a:ext>
+            </a:extLst>
+          </p:cNvPr>
+          <p:cNvSpPr txBox="1"/>
+          <p:nvPr/>
+        </p:nvSpPr>
+        <p:spPr>
+          <a:xfrm>
+            <a:off x="5475323" y="1601620"/>
+            <a:ext cx="1128642" cy="276999"/>
+          </a:xfrm>
+          <a:prstGeom prst="rect">
+            <a:avLst/>
+          </a:prstGeom>
+          <a:noFill/>
+        </p:spPr>
+        <p:txBody>
+          <a:bodyPr wrap="none" rtlCol="0">
+            <a:spAutoFit/>
+          </a:bodyPr>
+          <a:lstStyle/>
+          <a:p>
+            <a:r>
+              <a:rPr lang="en-JP" sz="1200" dirty="0">
+                <a:latin typeface="Arial" panose="020B0604020202020204" pitchFamily="34" charset="0"/>
+                <a:cs typeface="Arial" panose="020B0604020202020204" pitchFamily="34" charset="0"/>
+              </a:rPr>
+              <a:t>AT3G13880.1</a:t>
+            </a:r>
+          </a:p>
+        </p:txBody>
+      </p:sp>
+      <p:sp>
+        <p:nvSpPr>
+          <p:cNvPr id="65" name="TextBox 64">
+            <a:extLst>
+              <a:ext uri="{FF2B5EF4-FFF2-40B4-BE49-F238E27FC236}">
+                <a16:creationId xmlns:a16="http://schemas.microsoft.com/office/drawing/2014/main" id="{B1892F93-38B4-8D52-0994-F34BD47D0327}"/>
+              </a:ext>
+            </a:extLst>
+          </p:cNvPr>
+          <p:cNvSpPr txBox="1"/>
+          <p:nvPr/>
+        </p:nvSpPr>
+        <p:spPr>
+          <a:xfrm>
+            <a:off x="5665962" y="1237602"/>
+            <a:ext cx="671979" cy="276999"/>
+          </a:xfrm>
+          <a:prstGeom prst="rect">
+            <a:avLst/>
+          </a:prstGeom>
+          <a:noFill/>
+        </p:spPr>
+        <p:txBody>
+          <a:bodyPr wrap="none" rtlCol="0">
+            <a:spAutoFit/>
+          </a:bodyPr>
+          <a:lstStyle/>
+          <a:p>
+            <a:r>
+              <a:rPr lang="en-JP" sz="1200" b="1" i="1" dirty="0">
+                <a:latin typeface="Arial" panose="020B0604020202020204" pitchFamily="34" charset="0"/>
+                <a:cs typeface="Arial" panose="020B0604020202020204" pitchFamily="34" charset="0"/>
+              </a:rPr>
+              <a:t>OTP72</a:t>
+            </a:r>
+          </a:p>
+        </p:txBody>
+      </p:sp>
+      <p:sp>
+        <p:nvSpPr>
+          <p:cNvPr id="66" name="TextBox 65">
+            <a:extLst>
+              <a:ext uri="{FF2B5EF4-FFF2-40B4-BE49-F238E27FC236}">
+                <a16:creationId xmlns:a16="http://schemas.microsoft.com/office/drawing/2014/main" id="{5E1EA857-302F-65D5-C6BB-EA769EF98694}"/>
+              </a:ext>
+            </a:extLst>
+          </p:cNvPr>
+          <p:cNvSpPr txBox="1"/>
+          <p:nvPr/>
+        </p:nvSpPr>
+        <p:spPr>
+          <a:xfrm>
+            <a:off x="5844581" y="1938055"/>
+            <a:ext cx="1128642" cy="276999"/>
+          </a:xfrm>
+          <a:prstGeom prst="rect">
+            <a:avLst/>
+          </a:prstGeom>
+          <a:noFill/>
+        </p:spPr>
+        <p:txBody>
+          <a:bodyPr wrap="none" rtlCol="0">
+            <a:spAutoFit/>
+          </a:bodyPr>
+          <a:lstStyle/>
+          <a:p>
+            <a:r>
+              <a:rPr lang="en-JP" sz="1200" dirty="0">
+                <a:solidFill>
+                  <a:srgbClr val="FF0000"/>
+                </a:solidFill>
+                <a:latin typeface="Arial" panose="020B0604020202020204" pitchFamily="34" charset="0"/>
+                <a:cs typeface="Arial" panose="020B0604020202020204" pitchFamily="34" charset="0"/>
+              </a:rPr>
+              <a:t>AT3G13882.1</a:t>
+            </a:r>
+          </a:p>
+        </p:txBody>
+      </p:sp>
+      <p:sp>
+        <p:nvSpPr>
+          <p:cNvPr id="67" name="TextBox 66">
+            <a:extLst>
+              <a:ext uri="{FF2B5EF4-FFF2-40B4-BE49-F238E27FC236}">
+                <a16:creationId xmlns:a16="http://schemas.microsoft.com/office/drawing/2014/main" id="{A7315CB5-4B90-D92E-3ACF-D345F39C9861}"/>
+              </a:ext>
+            </a:extLst>
+          </p:cNvPr>
+          <p:cNvSpPr txBox="1"/>
+          <p:nvPr/>
+        </p:nvSpPr>
+        <p:spPr>
+          <a:xfrm>
+            <a:off x="5854104" y="2304775"/>
+            <a:ext cx="1128642" cy="276999"/>
+          </a:xfrm>
+          <a:prstGeom prst="rect">
+            <a:avLst/>
+          </a:prstGeom>
+          <a:noFill/>
+        </p:spPr>
+        <p:txBody>
+          <a:bodyPr wrap="none" rtlCol="0">
+            <a:spAutoFit/>
+          </a:bodyPr>
+          <a:lstStyle/>
+          <a:p>
+            <a:r>
+              <a:rPr lang="en-JP" sz="1200" dirty="0">
+                <a:solidFill>
+                  <a:srgbClr val="FF0000"/>
+                </a:solidFill>
+                <a:latin typeface="Arial" panose="020B0604020202020204" pitchFamily="34" charset="0"/>
+                <a:cs typeface="Arial" panose="020B0604020202020204" pitchFamily="34" charset="0"/>
+              </a:rPr>
+              <a:t>AT3G13882.2</a:t>
+            </a:r>
+          </a:p>
+        </p:txBody>
+      </p:sp>
+      <p:sp>
+        <p:nvSpPr>
+          <p:cNvPr id="68" name="TextBox 67">
+            <a:extLst>
+              <a:ext uri="{FF2B5EF4-FFF2-40B4-BE49-F238E27FC236}">
+                <a16:creationId xmlns:a16="http://schemas.microsoft.com/office/drawing/2014/main" id="{C605DD34-1E9D-D88C-FA82-F0702FE4B78D}"/>
+              </a:ext>
+            </a:extLst>
+          </p:cNvPr>
+          <p:cNvSpPr txBox="1"/>
+          <p:nvPr/>
+        </p:nvSpPr>
+        <p:spPr>
+          <a:xfrm>
+            <a:off x="6932623" y="1600593"/>
+            <a:ext cx="1128642" cy="276999"/>
+          </a:xfrm>
+          <a:prstGeom prst="rect">
+            <a:avLst/>
+          </a:prstGeom>
+          <a:noFill/>
+        </p:spPr>
+        <p:txBody>
+          <a:bodyPr wrap="none" rtlCol="0">
+            <a:spAutoFit/>
+          </a:bodyPr>
+          <a:lstStyle/>
+          <a:p>
+            <a:r>
+              <a:rPr lang="en-JP" sz="1200" dirty="0">
+                <a:solidFill>
+                  <a:srgbClr val="FF0000"/>
+                </a:solidFill>
+                <a:latin typeface="Arial" panose="020B0604020202020204" pitchFamily="34" charset="0"/>
+                <a:cs typeface="Arial" panose="020B0604020202020204" pitchFamily="34" charset="0"/>
+              </a:rPr>
+              <a:t>AT3G13890.1</a:t>
+            </a:r>
+          </a:p>
+        </p:txBody>
+      </p:sp>
+      <p:sp>
+        <p:nvSpPr>
+          <p:cNvPr id="69" name="TextBox 68">
+            <a:extLst>
+              <a:ext uri="{FF2B5EF4-FFF2-40B4-BE49-F238E27FC236}">
+                <a16:creationId xmlns:a16="http://schemas.microsoft.com/office/drawing/2014/main" id="{B10BB8D6-0DDB-7CE0-1D75-771104983351}"/>
+              </a:ext>
+            </a:extLst>
+          </p:cNvPr>
+          <p:cNvSpPr txBox="1"/>
+          <p:nvPr/>
+        </p:nvSpPr>
+        <p:spPr>
+          <a:xfrm>
+            <a:off x="6942270" y="1909481"/>
+            <a:ext cx="1128642" cy="276999"/>
+          </a:xfrm>
+          <a:prstGeom prst="rect">
+            <a:avLst/>
+          </a:prstGeom>
+          <a:noFill/>
+        </p:spPr>
+        <p:txBody>
+          <a:bodyPr wrap="none" rtlCol="0">
+            <a:spAutoFit/>
+          </a:bodyPr>
+          <a:lstStyle/>
+          <a:p>
+            <a:r>
+              <a:rPr lang="en-JP" sz="1200" dirty="0">
+                <a:solidFill>
+                  <a:srgbClr val="FF0000"/>
+                </a:solidFill>
+                <a:latin typeface="Arial" panose="020B0604020202020204" pitchFamily="34" charset="0"/>
+                <a:cs typeface="Arial" panose="020B0604020202020204" pitchFamily="34" charset="0"/>
+              </a:rPr>
+              <a:t>AT3G13890.2</a:t>
+            </a:r>
+          </a:p>
+        </p:txBody>
+      </p:sp>
+      <p:sp>
+        <p:nvSpPr>
+          <p:cNvPr id="70" name="TextBox 69">
+            <a:extLst>
+              <a:ext uri="{FF2B5EF4-FFF2-40B4-BE49-F238E27FC236}">
+                <a16:creationId xmlns:a16="http://schemas.microsoft.com/office/drawing/2014/main" id="{C0F9224E-9896-5B6A-CE28-C5DC137A6972}"/>
+              </a:ext>
+            </a:extLst>
+          </p:cNvPr>
+          <p:cNvSpPr txBox="1"/>
+          <p:nvPr/>
+        </p:nvSpPr>
+        <p:spPr>
+          <a:xfrm>
+            <a:off x="7059582" y="1247716"/>
+            <a:ext cx="696024" cy="276999"/>
+          </a:xfrm>
+          <a:prstGeom prst="rect">
+            <a:avLst/>
+          </a:prstGeom>
+          <a:noFill/>
+        </p:spPr>
+        <p:txBody>
+          <a:bodyPr wrap="none" rtlCol="0">
+            <a:spAutoFit/>
+          </a:bodyPr>
+          <a:lstStyle/>
+          <a:p>
+            <a:r>
+              <a:rPr lang="en-JP" sz="1200" b="1" i="1" dirty="0">
+                <a:solidFill>
+                  <a:srgbClr val="FF0000"/>
+                </a:solidFill>
+                <a:latin typeface="Arial" panose="020B0604020202020204" pitchFamily="34" charset="0"/>
+                <a:cs typeface="Arial" panose="020B0604020202020204" pitchFamily="34" charset="0"/>
+              </a:rPr>
+              <a:t>MYB26</a:t>
+            </a:r>
+          </a:p>
+        </p:txBody>
+      </p:sp>
+      <p:sp>
+        <p:nvSpPr>
+          <p:cNvPr id="71" name="TextBox 70">
+            <a:extLst>
+              <a:ext uri="{FF2B5EF4-FFF2-40B4-BE49-F238E27FC236}">
+                <a16:creationId xmlns:a16="http://schemas.microsoft.com/office/drawing/2014/main" id="{D69A28AA-2766-D28D-F994-6B01AAF1689F}"/>
+              </a:ext>
+            </a:extLst>
+          </p:cNvPr>
+          <p:cNvSpPr txBox="1"/>
+          <p:nvPr/>
+        </p:nvSpPr>
+        <p:spPr>
+          <a:xfrm>
+            <a:off x="2581804" y="1597907"/>
+            <a:ext cx="1128642" cy="276999"/>
+          </a:xfrm>
+          <a:prstGeom prst="rect">
+            <a:avLst/>
+          </a:prstGeom>
+          <a:noFill/>
+        </p:spPr>
+        <p:txBody>
+          <a:bodyPr wrap="none" rtlCol="0">
+            <a:spAutoFit/>
+          </a:bodyPr>
+          <a:lstStyle/>
+          <a:p>
+            <a:r>
+              <a:rPr lang="en-JP" sz="1200" dirty="0">
+                <a:latin typeface="Arial" panose="020B0604020202020204" pitchFamily="34" charset="0"/>
+                <a:cs typeface="Arial" panose="020B0604020202020204" pitchFamily="34" charset="0"/>
+              </a:rPr>
+              <a:t>AT3G13860.1</a:t>
+            </a:r>
+          </a:p>
+        </p:txBody>
+      </p:sp>
+      <p:sp>
+        <p:nvSpPr>
+          <p:cNvPr id="72" name="TextBox 71">
+            <a:extLst>
+              <a:ext uri="{FF2B5EF4-FFF2-40B4-BE49-F238E27FC236}">
+                <a16:creationId xmlns:a16="http://schemas.microsoft.com/office/drawing/2014/main" id="{3CED43A6-72B3-DEF4-C409-1D82F3090E36}"/>
+              </a:ext>
+            </a:extLst>
+          </p:cNvPr>
+          <p:cNvSpPr txBox="1"/>
+          <p:nvPr/>
+        </p:nvSpPr>
+        <p:spPr>
+          <a:xfrm>
+            <a:off x="8541545" y="1583065"/>
+            <a:ext cx="1128642" cy="276999"/>
+          </a:xfrm>
+          <a:prstGeom prst="rect">
+            <a:avLst/>
+          </a:prstGeom>
+          <a:noFill/>
+        </p:spPr>
+        <p:txBody>
+          <a:bodyPr wrap="none" rtlCol="0">
+            <a:spAutoFit/>
+          </a:bodyPr>
+          <a:lstStyle/>
+          <a:p>
+            <a:r>
+              <a:rPr lang="en-JP" sz="1200" dirty="0">
+                <a:solidFill>
+                  <a:srgbClr val="FF0000"/>
+                </a:solidFill>
+                <a:latin typeface="Arial" panose="020B0604020202020204" pitchFamily="34" charset="0"/>
+                <a:cs typeface="Arial" panose="020B0604020202020204" pitchFamily="34" charset="0"/>
+              </a:rPr>
+              <a:t>AT3G13898.1</a:t>
+            </a:r>
+          </a:p>
+        </p:txBody>
+      </p:sp>
+      <p:sp>
+        <p:nvSpPr>
+          <p:cNvPr id="73" name="TextBox 72">
+            <a:extLst>
+              <a:ext uri="{FF2B5EF4-FFF2-40B4-BE49-F238E27FC236}">
+                <a16:creationId xmlns:a16="http://schemas.microsoft.com/office/drawing/2014/main" id="{70F9CB74-5A92-6520-C887-1BCBC0E6DE9A}"/>
+              </a:ext>
+            </a:extLst>
+          </p:cNvPr>
+          <p:cNvSpPr txBox="1"/>
+          <p:nvPr/>
+        </p:nvSpPr>
+        <p:spPr>
+          <a:xfrm>
+            <a:off x="9733520" y="1566783"/>
+            <a:ext cx="1128642" cy="276999"/>
+          </a:xfrm>
+          <a:prstGeom prst="rect">
+            <a:avLst/>
+          </a:prstGeom>
+          <a:noFill/>
+        </p:spPr>
+        <p:txBody>
+          <a:bodyPr wrap="none" rtlCol="0">
+            <a:spAutoFit/>
+          </a:bodyPr>
+          <a:lstStyle/>
+          <a:p>
+            <a:r>
+              <a:rPr lang="en-JP" sz="1200" dirty="0">
+                <a:latin typeface="Arial" panose="020B0604020202020204" pitchFamily="34" charset="0"/>
+                <a:cs typeface="Arial" panose="020B0604020202020204" pitchFamily="34" charset="0"/>
+              </a:rPr>
+              <a:t>AT3G13900.1</a:t>
+            </a:r>
+          </a:p>
+        </p:txBody>
+      </p:sp>
+      <p:sp>
+        <p:nvSpPr>
+          <p:cNvPr id="74" name="TextBox 73">
+            <a:extLst>
+              <a:ext uri="{FF2B5EF4-FFF2-40B4-BE49-F238E27FC236}">
+                <a16:creationId xmlns:a16="http://schemas.microsoft.com/office/drawing/2014/main" id="{E21AB324-8A89-164A-F3A6-AFF3844FD82D}"/>
+              </a:ext>
+            </a:extLst>
+          </p:cNvPr>
+          <p:cNvSpPr txBox="1"/>
+          <p:nvPr/>
+        </p:nvSpPr>
+        <p:spPr>
+          <a:xfrm>
+            <a:off x="9885920" y="1904924"/>
+            <a:ext cx="1128642" cy="276999"/>
+          </a:xfrm>
+          <a:prstGeom prst="rect">
+            <a:avLst/>
+          </a:prstGeom>
+          <a:noFill/>
+        </p:spPr>
+        <p:txBody>
+          <a:bodyPr wrap="none" rtlCol="0">
+            <a:spAutoFit/>
+          </a:bodyPr>
+          <a:lstStyle/>
+          <a:p>
+            <a:r>
+              <a:rPr lang="en-JP" sz="1200" dirty="0">
+                <a:latin typeface="Arial" panose="020B0604020202020204" pitchFamily="34" charset="0"/>
+                <a:cs typeface="Arial" panose="020B0604020202020204" pitchFamily="34" charset="0"/>
+              </a:rPr>
+              <a:t>AT3G13900.2</a:t>
+            </a:r>
+          </a:p>
+        </p:txBody>
+      </p:sp>
+      <p:sp>
+        <p:nvSpPr>
+          <p:cNvPr id="75" name="TextBox 74">
+            <a:extLst>
+              <a:ext uri="{FF2B5EF4-FFF2-40B4-BE49-F238E27FC236}">
+                <a16:creationId xmlns:a16="http://schemas.microsoft.com/office/drawing/2014/main" id="{1EAF3AF6-DEDE-1338-8C71-BDE7F1132DAF}"/>
+              </a:ext>
+            </a:extLst>
+          </p:cNvPr>
+          <p:cNvSpPr txBox="1"/>
+          <p:nvPr/>
+        </p:nvSpPr>
+        <p:spPr>
+          <a:xfrm>
+            <a:off x="9895442" y="2243064"/>
+            <a:ext cx="1128642" cy="276999"/>
+          </a:xfrm>
+          <a:prstGeom prst="rect">
+            <a:avLst/>
+          </a:prstGeom>
+          <a:noFill/>
+        </p:spPr>
+        <p:txBody>
+          <a:bodyPr wrap="none" rtlCol="0">
+            <a:spAutoFit/>
+          </a:bodyPr>
+          <a:lstStyle/>
+          <a:p>
+            <a:r>
+              <a:rPr lang="en-JP" sz="1200" dirty="0">
+                <a:latin typeface="Arial" panose="020B0604020202020204" pitchFamily="34" charset="0"/>
+                <a:cs typeface="Arial" panose="020B0604020202020204" pitchFamily="34" charset="0"/>
+              </a:rPr>
+              <a:t>AT3G13900.3</a:t>
+            </a:r>
+          </a:p>
+        </p:txBody>
+      </p:sp>
+      <p:sp>
+        <p:nvSpPr>
+          <p:cNvPr id="76" name="TextBox 75">
+            <a:extLst>
+              <a:ext uri="{FF2B5EF4-FFF2-40B4-BE49-F238E27FC236}">
+                <a16:creationId xmlns:a16="http://schemas.microsoft.com/office/drawing/2014/main" id="{C5930510-CE41-FE97-2D6C-2ED0AA9C2694}"/>
+              </a:ext>
+            </a:extLst>
+          </p:cNvPr>
+          <p:cNvSpPr txBox="1"/>
+          <p:nvPr/>
+        </p:nvSpPr>
+        <p:spPr>
+          <a:xfrm>
+            <a:off x="10650458" y="2581458"/>
+            <a:ext cx="1128642" cy="276999"/>
+          </a:xfrm>
+          <a:prstGeom prst="rect">
+            <a:avLst/>
+          </a:prstGeom>
+          <a:noFill/>
+        </p:spPr>
+        <p:txBody>
+          <a:bodyPr wrap="none" rtlCol="0">
+            <a:spAutoFit/>
+          </a:bodyPr>
+          <a:lstStyle/>
+          <a:p>
+            <a:r>
+              <a:rPr lang="en-JP" sz="1200" dirty="0">
+                <a:latin typeface="Arial" panose="020B0604020202020204" pitchFamily="34" charset="0"/>
+                <a:cs typeface="Arial" panose="020B0604020202020204" pitchFamily="34" charset="0"/>
+              </a:rPr>
+              <a:t>AT3G13910.1</a:t>
+            </a:r>
+          </a:p>
+        </p:txBody>
+      </p:sp>
+      <p:sp>
+        <p:nvSpPr>
+          <p:cNvPr id="77" name="TextBox 76">
+            <a:extLst>
+              <a:ext uri="{FF2B5EF4-FFF2-40B4-BE49-F238E27FC236}">
+                <a16:creationId xmlns:a16="http://schemas.microsoft.com/office/drawing/2014/main" id="{1AE53AD9-074A-C04F-4EA7-383393BBE5CE}"/>
+              </a:ext>
+            </a:extLst>
+          </p:cNvPr>
+          <p:cNvSpPr txBox="1"/>
+          <p:nvPr/>
+        </p:nvSpPr>
+        <p:spPr>
+          <a:xfrm>
+            <a:off x="10660196" y="2919482"/>
+            <a:ext cx="1128642" cy="276999"/>
+          </a:xfrm>
+          <a:prstGeom prst="rect">
+            <a:avLst/>
+          </a:prstGeom>
+          <a:noFill/>
+        </p:spPr>
+        <p:txBody>
+          <a:bodyPr wrap="none" rtlCol="0">
+            <a:spAutoFit/>
+          </a:bodyPr>
+          <a:lstStyle/>
+          <a:p>
+            <a:r>
+              <a:rPr lang="en-JP" sz="1200" dirty="0">
+                <a:latin typeface="Arial" panose="020B0604020202020204" pitchFamily="34" charset="0"/>
+                <a:cs typeface="Arial" panose="020B0604020202020204" pitchFamily="34" charset="0"/>
+              </a:rPr>
+              <a:t>AT3G13920.1</a:t>
+            </a:r>
+          </a:p>
+        </p:txBody>
+      </p:sp>
+      <p:sp>
+        <p:nvSpPr>
+          <p:cNvPr id="81" name="TextBox 80">
+            <a:extLst>
+              <a:ext uri="{FF2B5EF4-FFF2-40B4-BE49-F238E27FC236}">
+                <a16:creationId xmlns:a16="http://schemas.microsoft.com/office/drawing/2014/main" id="{2EA12858-C306-A72F-1C48-0437AE9DCC1A}"/>
+              </a:ext>
+            </a:extLst>
+          </p:cNvPr>
+          <p:cNvSpPr txBox="1"/>
+          <p:nvPr/>
+        </p:nvSpPr>
+        <p:spPr>
+          <a:xfrm>
+            <a:off x="7466982" y="3446028"/>
+            <a:ext cx="779381" cy="276999"/>
+          </a:xfrm>
+          <a:prstGeom prst="rect">
+            <a:avLst/>
+          </a:prstGeom>
+          <a:noFill/>
+        </p:spPr>
+        <p:txBody>
+          <a:bodyPr wrap="none" rtlCol="0">
+            <a:spAutoFit/>
+          </a:bodyPr>
+          <a:lstStyle/>
+          <a:p>
+            <a:r>
+              <a:rPr lang="en-JP" sz="1200" dirty="0">
+                <a:solidFill>
+                  <a:srgbClr val="FF0000"/>
+                </a:solidFill>
+                <a:latin typeface="Arial" panose="020B0604020202020204" pitchFamily="34" charset="0"/>
+                <a:cs typeface="Arial" panose="020B0604020202020204" pitchFamily="34" charset="0"/>
+              </a:rPr>
+              <a:t>4579292</a:t>
+            </a:r>
           </a:p>
         </p:txBody>
       </p:sp>
@@ -3856,6 +6234,1875 @@
 </file>
 
 <file path=ppt/slides/slide6.xml><?xml version="1.0" encoding="utf-8"?>
+<p:sld xmlns:a="http://schemas.openxmlformats.org/drawingml/2006/main" xmlns:r="http://schemas.openxmlformats.org/officeDocument/2006/relationships" xmlns:p="http://schemas.openxmlformats.org/presentationml/2006/main">
+  <p:cSld>
+    <p:spTree>
+      <p:nvGrpSpPr>
+        <p:cNvPr id="1" name=""/>
+        <p:cNvGrpSpPr/>
+        <p:nvPr/>
+      </p:nvGrpSpPr>
+      <p:grpSpPr>
+        <a:xfrm>
+          <a:off x="0" y="0"/>
+          <a:ext cx="0" cy="0"/>
+          <a:chOff x="0" y="0"/>
+          <a:chExt cx="0" cy="0"/>
+        </a:xfrm>
+      </p:grpSpPr>
+      <p:pic>
+        <p:nvPicPr>
+          <p:cNvPr id="5" name="Picture 4">
+            <a:extLst>
+              <a:ext uri="{FF2B5EF4-FFF2-40B4-BE49-F238E27FC236}">
+                <a16:creationId xmlns:a16="http://schemas.microsoft.com/office/drawing/2014/main" id="{C4F36E06-6134-E64F-8524-3B2C9DB61049}"/>
+              </a:ext>
+            </a:extLst>
+          </p:cNvPr>
+          <p:cNvPicPr>
+            <a:picLocks noChangeAspect="1"/>
+          </p:cNvPicPr>
+          <p:nvPr/>
+        </p:nvPicPr>
+        <p:blipFill>
+          <a:blip r:embed="rId2"/>
+          <a:stretch>
+            <a:fillRect/>
+          </a:stretch>
+        </p:blipFill>
+        <p:spPr>
+          <a:xfrm>
+            <a:off x="1661782" y="3506400"/>
+            <a:ext cx="7056000" cy="3528000"/>
+          </a:xfrm>
+          <a:prstGeom prst="rect">
+            <a:avLst/>
+          </a:prstGeom>
+        </p:spPr>
+      </p:pic>
+      <p:pic>
+        <p:nvPicPr>
+          <p:cNvPr id="8" name="Picture 7">
+            <a:extLst>
+              <a:ext uri="{FF2B5EF4-FFF2-40B4-BE49-F238E27FC236}">
+                <a16:creationId xmlns:a16="http://schemas.microsoft.com/office/drawing/2014/main" id="{3583F55A-2E1B-214E-9C57-0A4BC2261963}"/>
+              </a:ext>
+            </a:extLst>
+          </p:cNvPr>
+          <p:cNvPicPr>
+            <a:picLocks noChangeAspect="1"/>
+          </p:cNvPicPr>
+          <p:nvPr/>
+        </p:nvPicPr>
+        <p:blipFill>
+          <a:blip r:embed="rId3"/>
+          <a:stretch>
+            <a:fillRect/>
+          </a:stretch>
+        </p:blipFill>
+        <p:spPr>
+          <a:xfrm>
+            <a:off x="8466434" y="3617209"/>
+            <a:ext cx="3240000" cy="3240000"/>
+          </a:xfrm>
+          <a:prstGeom prst="rect">
+            <a:avLst/>
+          </a:prstGeom>
+        </p:spPr>
+      </p:pic>
+      <p:cxnSp>
+        <p:nvCxnSpPr>
+          <p:cNvPr id="3" name="Straight Arrow Connector 2">
+            <a:extLst>
+              <a:ext uri="{FF2B5EF4-FFF2-40B4-BE49-F238E27FC236}">
+                <a16:creationId xmlns:a16="http://schemas.microsoft.com/office/drawing/2014/main" id="{3D4A6D9F-24E5-2FF1-3833-0BEDCE174AC5}"/>
+              </a:ext>
+            </a:extLst>
+          </p:cNvPr>
+          <p:cNvCxnSpPr/>
+          <p:nvPr/>
+        </p:nvCxnSpPr>
+        <p:spPr>
+          <a:xfrm flipH="1">
+            <a:off x="2986201" y="2061298"/>
+            <a:ext cx="1980000" cy="0"/>
+          </a:xfrm>
+          <a:prstGeom prst="straightConnector1">
+            <a:avLst/>
+          </a:prstGeom>
+          <a:ln w="28575">
+            <a:solidFill>
+              <a:schemeClr val="tx1"/>
+            </a:solidFill>
+            <a:tailEnd type="triangle"/>
+          </a:ln>
+        </p:spPr>
+        <p:style>
+          <a:lnRef idx="1">
+            <a:schemeClr val="accent1"/>
+          </a:lnRef>
+          <a:fillRef idx="0">
+            <a:schemeClr val="accent1"/>
+          </a:fillRef>
+          <a:effectRef idx="0">
+            <a:schemeClr val="accent1"/>
+          </a:effectRef>
+          <a:fontRef idx="minor">
+            <a:schemeClr val="tx1"/>
+          </a:fontRef>
+        </p:style>
+      </p:cxnSp>
+      <p:cxnSp>
+        <p:nvCxnSpPr>
+          <p:cNvPr id="26" name="Straight Connector 25">
+            <a:extLst>
+              <a:ext uri="{FF2B5EF4-FFF2-40B4-BE49-F238E27FC236}">
+                <a16:creationId xmlns:a16="http://schemas.microsoft.com/office/drawing/2014/main" id="{4D8A06BF-D709-09E1-EEC9-227B545CD20D}"/>
+              </a:ext>
+            </a:extLst>
+          </p:cNvPr>
+          <p:cNvCxnSpPr/>
+          <p:nvPr/>
+        </p:nvCxnSpPr>
+        <p:spPr>
+          <a:xfrm>
+            <a:off x="7417849" y="1363142"/>
+            <a:ext cx="0" cy="2016000"/>
+          </a:xfrm>
+          <a:prstGeom prst="line">
+            <a:avLst/>
+          </a:prstGeom>
+          <a:ln w="12700">
+            <a:solidFill>
+              <a:srgbClr val="FF0000"/>
+            </a:solidFill>
+          </a:ln>
+        </p:spPr>
+        <p:style>
+          <a:lnRef idx="1">
+            <a:schemeClr val="accent1"/>
+          </a:lnRef>
+          <a:fillRef idx="0">
+            <a:schemeClr val="accent1"/>
+          </a:fillRef>
+          <a:effectRef idx="0">
+            <a:schemeClr val="accent1"/>
+          </a:effectRef>
+          <a:fontRef idx="minor">
+            <a:schemeClr val="tx1"/>
+          </a:fontRef>
+        </p:style>
+      </p:cxnSp>
+      <p:cxnSp>
+        <p:nvCxnSpPr>
+          <p:cNvPr id="34" name="Straight Arrow Connector 33">
+            <a:extLst>
+              <a:ext uri="{FF2B5EF4-FFF2-40B4-BE49-F238E27FC236}">
+                <a16:creationId xmlns:a16="http://schemas.microsoft.com/office/drawing/2014/main" id="{FEE53FB6-EBEC-E70A-9617-0C922EAC951E}"/>
+              </a:ext>
+            </a:extLst>
+          </p:cNvPr>
+          <p:cNvCxnSpPr>
+            <a:cxnSpLocks/>
+          </p:cNvCxnSpPr>
+          <p:nvPr/>
+        </p:nvCxnSpPr>
+        <p:spPr>
+          <a:xfrm flipH="1">
+            <a:off x="5425243" y="3404013"/>
+            <a:ext cx="1992606" cy="453073"/>
+          </a:xfrm>
+          <a:prstGeom prst="straightConnector1">
+            <a:avLst/>
+          </a:prstGeom>
+          <a:ln w="12700">
+            <a:solidFill>
+              <a:srgbClr val="FF0000"/>
+            </a:solidFill>
+            <a:tailEnd type="triangle"/>
+          </a:ln>
+        </p:spPr>
+        <p:style>
+          <a:lnRef idx="1">
+            <a:schemeClr val="accent1"/>
+          </a:lnRef>
+          <a:fillRef idx="0">
+            <a:schemeClr val="accent1"/>
+          </a:fillRef>
+          <a:effectRef idx="0">
+            <a:schemeClr val="accent1"/>
+          </a:effectRef>
+          <a:fontRef idx="minor">
+            <a:schemeClr val="tx1"/>
+          </a:fontRef>
+        </p:style>
+      </p:cxnSp>
+      <p:sp>
+        <p:nvSpPr>
+          <p:cNvPr id="36" name="Rectangle 35">
+            <a:extLst>
+              <a:ext uri="{FF2B5EF4-FFF2-40B4-BE49-F238E27FC236}">
+                <a16:creationId xmlns:a16="http://schemas.microsoft.com/office/drawing/2014/main" id="{00589F47-2E6F-7630-7DFC-D1BCFF0D9F7D}"/>
+              </a:ext>
+            </a:extLst>
+          </p:cNvPr>
+          <p:cNvSpPr/>
+          <p:nvPr/>
+        </p:nvSpPr>
+        <p:spPr>
+          <a:xfrm>
+            <a:off x="2196065" y="1373725"/>
+            <a:ext cx="9095755" cy="2022846"/>
+          </a:xfrm>
+          <a:prstGeom prst="rect">
+            <a:avLst/>
+          </a:prstGeom>
+          <a:noFill/>
+          <a:ln>
+            <a:solidFill>
+              <a:schemeClr val="tx1"/>
+            </a:solidFill>
+          </a:ln>
+        </p:spPr>
+        <p:style>
+          <a:lnRef idx="2">
+            <a:schemeClr val="accent1">
+              <a:shade val="50000"/>
+            </a:schemeClr>
+          </a:lnRef>
+          <a:fillRef idx="1">
+            <a:schemeClr val="accent1"/>
+          </a:fillRef>
+          <a:effectRef idx="0">
+            <a:schemeClr val="accent1"/>
+          </a:effectRef>
+          <a:fontRef idx="minor">
+            <a:schemeClr val="lt1"/>
+          </a:fontRef>
+        </p:style>
+        <p:txBody>
+          <a:bodyPr rtlCol="0" anchor="ctr"/>
+          <a:lstStyle/>
+          <a:p>
+            <a:pPr algn="ctr"/>
+            <a:endParaRPr lang="en-JP"/>
+          </a:p>
+        </p:txBody>
+      </p:sp>
+      <p:cxnSp>
+        <p:nvCxnSpPr>
+          <p:cNvPr id="37" name="Straight Arrow Connector 36">
+            <a:extLst>
+              <a:ext uri="{FF2B5EF4-FFF2-40B4-BE49-F238E27FC236}">
+                <a16:creationId xmlns:a16="http://schemas.microsoft.com/office/drawing/2014/main" id="{1BBAADB0-1471-6984-B556-2D1F4860E805}"/>
+              </a:ext>
+            </a:extLst>
+          </p:cNvPr>
+          <p:cNvCxnSpPr/>
+          <p:nvPr/>
+        </p:nvCxnSpPr>
+        <p:spPr>
+          <a:xfrm flipH="1">
+            <a:off x="2968481" y="2383818"/>
+            <a:ext cx="1980000" cy="0"/>
+          </a:xfrm>
+          <a:prstGeom prst="straightConnector1">
+            <a:avLst/>
+          </a:prstGeom>
+          <a:ln w="28575">
+            <a:solidFill>
+              <a:schemeClr val="tx1"/>
+            </a:solidFill>
+            <a:tailEnd type="triangle"/>
+          </a:ln>
+        </p:spPr>
+        <p:style>
+          <a:lnRef idx="1">
+            <a:schemeClr val="accent1"/>
+          </a:lnRef>
+          <a:fillRef idx="0">
+            <a:schemeClr val="accent1"/>
+          </a:fillRef>
+          <a:effectRef idx="0">
+            <a:schemeClr val="accent1"/>
+          </a:effectRef>
+          <a:fontRef idx="minor">
+            <a:schemeClr val="tx1"/>
+          </a:fontRef>
+        </p:style>
+      </p:cxnSp>
+      <p:cxnSp>
+        <p:nvCxnSpPr>
+          <p:cNvPr id="38" name="Straight Arrow Connector 37">
+            <a:extLst>
+              <a:ext uri="{FF2B5EF4-FFF2-40B4-BE49-F238E27FC236}">
+                <a16:creationId xmlns:a16="http://schemas.microsoft.com/office/drawing/2014/main" id="{5F5BFAAC-E4D4-4310-4487-CC271EC89F78}"/>
+              </a:ext>
+            </a:extLst>
+          </p:cNvPr>
+          <p:cNvCxnSpPr>
+            <a:cxnSpLocks/>
+          </p:cNvCxnSpPr>
+          <p:nvPr/>
+        </p:nvCxnSpPr>
+        <p:spPr>
+          <a:xfrm>
+            <a:off x="5170691" y="1729846"/>
+            <a:ext cx="864000" cy="0"/>
+          </a:xfrm>
+          <a:prstGeom prst="straightConnector1">
+            <a:avLst/>
+          </a:prstGeom>
+          <a:ln w="28575">
+            <a:solidFill>
+              <a:schemeClr val="tx1"/>
+            </a:solidFill>
+            <a:tailEnd type="triangle"/>
+          </a:ln>
+        </p:spPr>
+        <p:style>
+          <a:lnRef idx="1">
+            <a:schemeClr val="accent1"/>
+          </a:lnRef>
+          <a:fillRef idx="0">
+            <a:schemeClr val="accent1"/>
+          </a:fillRef>
+          <a:effectRef idx="0">
+            <a:schemeClr val="accent1"/>
+          </a:effectRef>
+          <a:fontRef idx="minor">
+            <a:schemeClr val="tx1"/>
+          </a:fontRef>
+        </p:style>
+      </p:cxnSp>
+      <p:cxnSp>
+        <p:nvCxnSpPr>
+          <p:cNvPr id="42" name="Straight Connector 41">
+            <a:extLst>
+              <a:ext uri="{FF2B5EF4-FFF2-40B4-BE49-F238E27FC236}">
+                <a16:creationId xmlns:a16="http://schemas.microsoft.com/office/drawing/2014/main" id="{ECBBE84E-C304-4333-5CC9-9A0E77523724}"/>
+              </a:ext>
+            </a:extLst>
+          </p:cNvPr>
+          <p:cNvCxnSpPr/>
+          <p:nvPr/>
+        </p:nvCxnSpPr>
+        <p:spPr>
+          <a:xfrm flipH="1">
+            <a:off x="2210353" y="1729846"/>
+            <a:ext cx="864000" cy="0"/>
+          </a:xfrm>
+          <a:prstGeom prst="line">
+            <a:avLst/>
+          </a:prstGeom>
+          <a:ln w="28575">
+            <a:solidFill>
+              <a:schemeClr val="tx1"/>
+            </a:solidFill>
+          </a:ln>
+        </p:spPr>
+        <p:style>
+          <a:lnRef idx="1">
+            <a:schemeClr val="accent1"/>
+          </a:lnRef>
+          <a:fillRef idx="0">
+            <a:schemeClr val="accent1"/>
+          </a:fillRef>
+          <a:effectRef idx="0">
+            <a:schemeClr val="accent1"/>
+          </a:effectRef>
+          <a:fontRef idx="minor">
+            <a:schemeClr val="tx1"/>
+          </a:fontRef>
+        </p:style>
+      </p:cxnSp>
+      <p:cxnSp>
+        <p:nvCxnSpPr>
+          <p:cNvPr id="43" name="Straight Arrow Connector 42">
+            <a:extLst>
+              <a:ext uri="{FF2B5EF4-FFF2-40B4-BE49-F238E27FC236}">
+                <a16:creationId xmlns:a16="http://schemas.microsoft.com/office/drawing/2014/main" id="{5411F6EA-BD80-6837-6185-952F42BF7EEB}"/>
+              </a:ext>
+            </a:extLst>
+          </p:cNvPr>
+          <p:cNvCxnSpPr>
+            <a:cxnSpLocks/>
+          </p:cNvCxnSpPr>
+          <p:nvPr/>
+        </p:nvCxnSpPr>
+        <p:spPr>
+          <a:xfrm>
+            <a:off x="9438150" y="1739180"/>
+            <a:ext cx="1728000" cy="0"/>
+          </a:xfrm>
+          <a:prstGeom prst="straightConnector1">
+            <a:avLst/>
+          </a:prstGeom>
+          <a:ln w="28575">
+            <a:solidFill>
+              <a:schemeClr val="tx1"/>
+            </a:solidFill>
+            <a:tailEnd type="triangle"/>
+          </a:ln>
+        </p:spPr>
+        <p:style>
+          <a:lnRef idx="1">
+            <a:schemeClr val="accent1"/>
+          </a:lnRef>
+          <a:fillRef idx="0">
+            <a:schemeClr val="accent1"/>
+          </a:fillRef>
+          <a:effectRef idx="0">
+            <a:schemeClr val="accent1"/>
+          </a:effectRef>
+          <a:fontRef idx="minor">
+            <a:schemeClr val="tx1"/>
+          </a:fontRef>
+        </p:style>
+      </p:cxnSp>
+      <p:cxnSp>
+        <p:nvCxnSpPr>
+          <p:cNvPr id="44" name="Straight Arrow Connector 43">
+            <a:extLst>
+              <a:ext uri="{FF2B5EF4-FFF2-40B4-BE49-F238E27FC236}">
+                <a16:creationId xmlns:a16="http://schemas.microsoft.com/office/drawing/2014/main" id="{B48E9D9E-DF34-7EDC-6BE3-FBC8B0B6F616}"/>
+              </a:ext>
+            </a:extLst>
+          </p:cNvPr>
+          <p:cNvCxnSpPr>
+            <a:cxnSpLocks/>
+          </p:cNvCxnSpPr>
+          <p:nvPr/>
+        </p:nvCxnSpPr>
+        <p:spPr>
+          <a:xfrm>
+            <a:off x="9547686" y="2063034"/>
+            <a:ext cx="1548000" cy="0"/>
+          </a:xfrm>
+          <a:prstGeom prst="straightConnector1">
+            <a:avLst/>
+          </a:prstGeom>
+          <a:ln w="28575">
+            <a:solidFill>
+              <a:schemeClr val="tx1"/>
+            </a:solidFill>
+            <a:tailEnd type="triangle"/>
+          </a:ln>
+        </p:spPr>
+        <p:style>
+          <a:lnRef idx="1">
+            <a:schemeClr val="accent1"/>
+          </a:lnRef>
+          <a:fillRef idx="0">
+            <a:schemeClr val="accent1"/>
+          </a:fillRef>
+          <a:effectRef idx="0">
+            <a:schemeClr val="accent1"/>
+          </a:effectRef>
+          <a:fontRef idx="minor">
+            <a:schemeClr val="tx1"/>
+          </a:fontRef>
+        </p:style>
+      </p:cxnSp>
+      <p:cxnSp>
+        <p:nvCxnSpPr>
+          <p:cNvPr id="45" name="Straight Arrow Connector 44">
+            <a:extLst>
+              <a:ext uri="{FF2B5EF4-FFF2-40B4-BE49-F238E27FC236}">
+                <a16:creationId xmlns:a16="http://schemas.microsoft.com/office/drawing/2014/main" id="{4B8EED6D-0516-DA37-A105-B5E10B2494B1}"/>
+              </a:ext>
+            </a:extLst>
+          </p:cNvPr>
+          <p:cNvCxnSpPr>
+            <a:cxnSpLocks/>
+          </p:cNvCxnSpPr>
+          <p:nvPr/>
+        </p:nvCxnSpPr>
+        <p:spPr>
+          <a:xfrm>
+            <a:off x="9557207" y="2386887"/>
+            <a:ext cx="1548000" cy="0"/>
+          </a:xfrm>
+          <a:prstGeom prst="straightConnector1">
+            <a:avLst/>
+          </a:prstGeom>
+          <a:ln w="28575">
+            <a:solidFill>
+              <a:schemeClr val="tx1"/>
+            </a:solidFill>
+            <a:tailEnd type="triangle"/>
+          </a:ln>
+        </p:spPr>
+        <p:style>
+          <a:lnRef idx="1">
+            <a:schemeClr val="accent1"/>
+          </a:lnRef>
+          <a:fillRef idx="0">
+            <a:schemeClr val="accent1"/>
+          </a:fillRef>
+          <a:effectRef idx="0">
+            <a:schemeClr val="accent1"/>
+          </a:effectRef>
+          <a:fontRef idx="minor">
+            <a:schemeClr val="tx1"/>
+          </a:fontRef>
+        </p:style>
+      </p:cxnSp>
+      <p:cxnSp>
+        <p:nvCxnSpPr>
+          <p:cNvPr id="46" name="Straight Arrow Connector 45">
+            <a:extLst>
+              <a:ext uri="{FF2B5EF4-FFF2-40B4-BE49-F238E27FC236}">
+                <a16:creationId xmlns:a16="http://schemas.microsoft.com/office/drawing/2014/main" id="{0F4FD263-9198-ABB4-9595-5FD3050ACC96}"/>
+              </a:ext>
+            </a:extLst>
+          </p:cNvPr>
+          <p:cNvCxnSpPr>
+            <a:cxnSpLocks/>
+          </p:cNvCxnSpPr>
+          <p:nvPr/>
+        </p:nvCxnSpPr>
+        <p:spPr>
+          <a:xfrm>
+            <a:off x="8712087" y="1726036"/>
+            <a:ext cx="432000" cy="0"/>
+          </a:xfrm>
+          <a:prstGeom prst="straightConnector1">
+            <a:avLst/>
+          </a:prstGeom>
+          <a:ln w="28575">
+            <a:solidFill>
+              <a:srgbClr val="FF0000"/>
+            </a:solidFill>
+            <a:tailEnd type="triangle"/>
+          </a:ln>
+        </p:spPr>
+        <p:style>
+          <a:lnRef idx="1">
+            <a:schemeClr val="accent1"/>
+          </a:lnRef>
+          <a:fillRef idx="0">
+            <a:schemeClr val="accent1"/>
+          </a:fillRef>
+          <a:effectRef idx="0">
+            <a:schemeClr val="accent1"/>
+          </a:effectRef>
+          <a:fontRef idx="minor">
+            <a:schemeClr val="tx1"/>
+          </a:fontRef>
+        </p:style>
+      </p:cxnSp>
+      <p:cxnSp>
+        <p:nvCxnSpPr>
+          <p:cNvPr id="47" name="Straight Arrow Connector 46">
+            <a:extLst>
+              <a:ext uri="{FF2B5EF4-FFF2-40B4-BE49-F238E27FC236}">
+                <a16:creationId xmlns:a16="http://schemas.microsoft.com/office/drawing/2014/main" id="{CF2B4F2C-17BD-E31C-0DE6-070FE33FEC5D}"/>
+              </a:ext>
+            </a:extLst>
+          </p:cNvPr>
+          <p:cNvCxnSpPr>
+            <a:cxnSpLocks/>
+          </p:cNvCxnSpPr>
+          <p:nvPr/>
+        </p:nvCxnSpPr>
+        <p:spPr>
+          <a:xfrm flipH="1">
+            <a:off x="6373232" y="1726034"/>
+            <a:ext cx="648000" cy="0"/>
+          </a:xfrm>
+          <a:prstGeom prst="straightConnector1">
+            <a:avLst/>
+          </a:prstGeom>
+          <a:ln w="28575">
+            <a:solidFill>
+              <a:srgbClr val="FF0000"/>
+            </a:solidFill>
+            <a:tailEnd type="triangle"/>
+          </a:ln>
+        </p:spPr>
+        <p:style>
+          <a:lnRef idx="1">
+            <a:schemeClr val="accent1"/>
+          </a:lnRef>
+          <a:fillRef idx="0">
+            <a:schemeClr val="accent1"/>
+          </a:fillRef>
+          <a:effectRef idx="0">
+            <a:schemeClr val="accent1"/>
+          </a:effectRef>
+          <a:fontRef idx="minor">
+            <a:schemeClr val="tx1"/>
+          </a:fontRef>
+        </p:style>
+      </p:cxnSp>
+      <p:cxnSp>
+        <p:nvCxnSpPr>
+          <p:cNvPr id="48" name="Straight Arrow Connector 47">
+            <a:extLst>
+              <a:ext uri="{FF2B5EF4-FFF2-40B4-BE49-F238E27FC236}">
+                <a16:creationId xmlns:a16="http://schemas.microsoft.com/office/drawing/2014/main" id="{4B1345F2-66F5-5E74-EE93-47039CAD1FEE}"/>
+              </a:ext>
+            </a:extLst>
+          </p:cNvPr>
+          <p:cNvCxnSpPr>
+            <a:cxnSpLocks/>
+          </p:cNvCxnSpPr>
+          <p:nvPr/>
+        </p:nvCxnSpPr>
+        <p:spPr>
+          <a:xfrm flipH="1">
+            <a:off x="6539920" y="2064175"/>
+            <a:ext cx="504000" cy="0"/>
+          </a:xfrm>
+          <a:prstGeom prst="straightConnector1">
+            <a:avLst/>
+          </a:prstGeom>
+          <a:ln w="28575">
+            <a:solidFill>
+              <a:srgbClr val="FF0000"/>
+            </a:solidFill>
+            <a:tailEnd type="triangle"/>
+          </a:ln>
+        </p:spPr>
+        <p:style>
+          <a:lnRef idx="1">
+            <a:schemeClr val="accent1"/>
+          </a:lnRef>
+          <a:fillRef idx="0">
+            <a:schemeClr val="accent1"/>
+          </a:fillRef>
+          <a:effectRef idx="0">
+            <a:schemeClr val="accent1"/>
+          </a:effectRef>
+          <a:fontRef idx="minor">
+            <a:schemeClr val="tx1"/>
+          </a:fontRef>
+        </p:style>
+      </p:cxnSp>
+      <p:cxnSp>
+        <p:nvCxnSpPr>
+          <p:cNvPr id="49" name="Straight Arrow Connector 48">
+            <a:extLst>
+              <a:ext uri="{FF2B5EF4-FFF2-40B4-BE49-F238E27FC236}">
+                <a16:creationId xmlns:a16="http://schemas.microsoft.com/office/drawing/2014/main" id="{0BFC9CC3-80F4-3F49-82AA-E5DC04C9B528}"/>
+              </a:ext>
+            </a:extLst>
+          </p:cNvPr>
+          <p:cNvCxnSpPr>
+            <a:cxnSpLocks/>
+          </p:cNvCxnSpPr>
+          <p:nvPr/>
+        </p:nvCxnSpPr>
+        <p:spPr>
+          <a:xfrm>
+            <a:off x="5939287" y="2061298"/>
+            <a:ext cx="612000" cy="0"/>
+          </a:xfrm>
+          <a:prstGeom prst="straightConnector1">
+            <a:avLst/>
+          </a:prstGeom>
+          <a:ln w="28575">
+            <a:solidFill>
+              <a:srgbClr val="FF0000"/>
+            </a:solidFill>
+            <a:tailEnd type="triangle"/>
+          </a:ln>
+        </p:spPr>
+        <p:style>
+          <a:lnRef idx="1">
+            <a:schemeClr val="accent1"/>
+          </a:lnRef>
+          <a:fillRef idx="0">
+            <a:schemeClr val="accent1"/>
+          </a:fillRef>
+          <a:effectRef idx="0">
+            <a:schemeClr val="accent1"/>
+          </a:effectRef>
+          <a:fontRef idx="minor">
+            <a:schemeClr val="tx1"/>
+          </a:fontRef>
+        </p:style>
+      </p:cxnSp>
+      <p:cxnSp>
+        <p:nvCxnSpPr>
+          <p:cNvPr id="50" name="Straight Arrow Connector 49">
+            <a:extLst>
+              <a:ext uri="{FF2B5EF4-FFF2-40B4-BE49-F238E27FC236}">
+                <a16:creationId xmlns:a16="http://schemas.microsoft.com/office/drawing/2014/main" id="{0ADEB4A4-7F78-C82F-0E96-8828E0CB060B}"/>
+              </a:ext>
+            </a:extLst>
+          </p:cNvPr>
+          <p:cNvCxnSpPr>
+            <a:cxnSpLocks/>
+          </p:cNvCxnSpPr>
+          <p:nvPr/>
+        </p:nvCxnSpPr>
+        <p:spPr>
+          <a:xfrm>
+            <a:off x="5920235" y="2385152"/>
+            <a:ext cx="612000" cy="0"/>
+          </a:xfrm>
+          <a:prstGeom prst="straightConnector1">
+            <a:avLst/>
+          </a:prstGeom>
+          <a:ln w="28575">
+            <a:solidFill>
+              <a:srgbClr val="FF0000"/>
+            </a:solidFill>
+            <a:tailEnd type="triangle"/>
+          </a:ln>
+        </p:spPr>
+        <p:style>
+          <a:lnRef idx="1">
+            <a:schemeClr val="accent1"/>
+          </a:lnRef>
+          <a:fillRef idx="0">
+            <a:schemeClr val="accent1"/>
+          </a:fillRef>
+          <a:effectRef idx="0">
+            <a:schemeClr val="accent1"/>
+          </a:effectRef>
+          <a:fontRef idx="minor">
+            <a:schemeClr val="tx1"/>
+          </a:fontRef>
+        </p:style>
+      </p:cxnSp>
+      <p:cxnSp>
+        <p:nvCxnSpPr>
+          <p:cNvPr id="52" name="Straight Arrow Connector 51">
+            <a:extLst>
+              <a:ext uri="{FF2B5EF4-FFF2-40B4-BE49-F238E27FC236}">
+                <a16:creationId xmlns:a16="http://schemas.microsoft.com/office/drawing/2014/main" id="{10970293-184B-54EB-5F2C-6A0EC19C1D08}"/>
+              </a:ext>
+            </a:extLst>
+          </p:cNvPr>
+          <p:cNvCxnSpPr>
+            <a:cxnSpLocks/>
+          </p:cNvCxnSpPr>
+          <p:nvPr/>
+        </p:nvCxnSpPr>
+        <p:spPr>
+          <a:xfrm flipH="1">
+            <a:off x="10856438" y="2719780"/>
+            <a:ext cx="432000" cy="0"/>
+          </a:xfrm>
+          <a:prstGeom prst="straightConnector1">
+            <a:avLst/>
+          </a:prstGeom>
+          <a:ln w="28575">
+            <a:solidFill>
+              <a:schemeClr val="tx1"/>
+            </a:solidFill>
+            <a:tailEnd type="triangle"/>
+          </a:ln>
+        </p:spPr>
+        <p:style>
+          <a:lnRef idx="1">
+            <a:schemeClr val="accent1"/>
+          </a:lnRef>
+          <a:fillRef idx="0">
+            <a:schemeClr val="accent1"/>
+          </a:fillRef>
+          <a:effectRef idx="0">
+            <a:schemeClr val="accent1"/>
+          </a:effectRef>
+          <a:fontRef idx="minor">
+            <a:schemeClr val="tx1"/>
+          </a:fontRef>
+        </p:style>
+      </p:cxnSp>
+      <p:cxnSp>
+        <p:nvCxnSpPr>
+          <p:cNvPr id="53" name="Straight Arrow Connector 52">
+            <a:extLst>
+              <a:ext uri="{FF2B5EF4-FFF2-40B4-BE49-F238E27FC236}">
+                <a16:creationId xmlns:a16="http://schemas.microsoft.com/office/drawing/2014/main" id="{94C3BA40-0EEB-3BCF-91FF-539DA1E7EA92}"/>
+              </a:ext>
+            </a:extLst>
+          </p:cNvPr>
+          <p:cNvCxnSpPr>
+            <a:cxnSpLocks/>
+          </p:cNvCxnSpPr>
+          <p:nvPr/>
+        </p:nvCxnSpPr>
+        <p:spPr>
+          <a:xfrm flipH="1">
+            <a:off x="10965974" y="3043634"/>
+            <a:ext cx="324000" cy="0"/>
+          </a:xfrm>
+          <a:prstGeom prst="straightConnector1">
+            <a:avLst/>
+          </a:prstGeom>
+          <a:ln w="28575">
+            <a:solidFill>
+              <a:schemeClr val="tx1"/>
+            </a:solidFill>
+            <a:tailEnd type="triangle"/>
+          </a:ln>
+        </p:spPr>
+        <p:style>
+          <a:lnRef idx="1">
+            <a:schemeClr val="accent1"/>
+          </a:lnRef>
+          <a:fillRef idx="0">
+            <a:schemeClr val="accent1"/>
+          </a:fillRef>
+          <a:effectRef idx="0">
+            <a:schemeClr val="accent1"/>
+          </a:effectRef>
+          <a:fontRef idx="minor">
+            <a:schemeClr val="tx1"/>
+          </a:fontRef>
+        </p:style>
+      </p:cxnSp>
+      <p:sp>
+        <p:nvSpPr>
+          <p:cNvPr id="54" name="TextBox 53">
+            <a:extLst>
+              <a:ext uri="{FF2B5EF4-FFF2-40B4-BE49-F238E27FC236}">
+                <a16:creationId xmlns:a16="http://schemas.microsoft.com/office/drawing/2014/main" id="{CBB7C0B6-E503-EB2C-7AF2-D987D31141D6}"/>
+              </a:ext>
+            </a:extLst>
+          </p:cNvPr>
+          <p:cNvSpPr txBox="1"/>
+          <p:nvPr/>
+        </p:nvSpPr>
+        <p:spPr>
+          <a:xfrm>
+            <a:off x="2096975" y="3357636"/>
+            <a:ext cx="8080867" cy="276999"/>
+          </a:xfrm>
+          <a:prstGeom prst="rect">
+            <a:avLst/>
+          </a:prstGeom>
+          <a:noFill/>
+        </p:spPr>
+        <p:txBody>
+          <a:bodyPr wrap="none" rtlCol="0">
+            <a:spAutoFit/>
+          </a:bodyPr>
+          <a:lstStyle/>
+          <a:p>
+            <a:r>
+              <a:rPr lang="en-JP" sz="1200" dirty="0">
+                <a:latin typeface="Arial" panose="020B0604020202020204" pitchFamily="34" charset="0"/>
+                <a:cs typeface="Arial" panose="020B0604020202020204" pitchFamily="34" charset="0"/>
+              </a:rPr>
+              <a:t>4562454                            4568284                             4574114                             4579943                             4585773</a:t>
+            </a:r>
+          </a:p>
+        </p:txBody>
+      </p:sp>
+      <p:cxnSp>
+        <p:nvCxnSpPr>
+          <p:cNvPr id="57" name="Straight Connector 56">
+            <a:extLst>
+              <a:ext uri="{FF2B5EF4-FFF2-40B4-BE49-F238E27FC236}">
+                <a16:creationId xmlns:a16="http://schemas.microsoft.com/office/drawing/2014/main" id="{D5D35D4A-5A36-639E-F4FE-1B2FB3BF34E0}"/>
+              </a:ext>
+            </a:extLst>
+          </p:cNvPr>
+          <p:cNvCxnSpPr/>
+          <p:nvPr/>
+        </p:nvCxnSpPr>
+        <p:spPr>
+          <a:xfrm>
+            <a:off x="9449900" y="1363520"/>
+            <a:ext cx="0" cy="2016000"/>
+          </a:xfrm>
+          <a:prstGeom prst="line">
+            <a:avLst/>
+          </a:prstGeom>
+          <a:ln>
+            <a:solidFill>
+              <a:schemeClr val="bg1">
+                <a:lumMod val="50000"/>
+              </a:schemeClr>
+            </a:solidFill>
+            <a:prstDash val="dash"/>
+          </a:ln>
+        </p:spPr>
+        <p:style>
+          <a:lnRef idx="1">
+            <a:schemeClr val="accent1"/>
+          </a:lnRef>
+          <a:fillRef idx="0">
+            <a:schemeClr val="accent1"/>
+          </a:fillRef>
+          <a:effectRef idx="0">
+            <a:schemeClr val="accent1"/>
+          </a:effectRef>
+          <a:fontRef idx="minor">
+            <a:schemeClr val="tx1"/>
+          </a:fontRef>
+        </p:style>
+      </p:cxnSp>
+      <p:cxnSp>
+        <p:nvCxnSpPr>
+          <p:cNvPr id="58" name="Straight Connector 57">
+            <a:extLst>
+              <a:ext uri="{FF2B5EF4-FFF2-40B4-BE49-F238E27FC236}">
+                <a16:creationId xmlns:a16="http://schemas.microsoft.com/office/drawing/2014/main" id="{EA966E42-9474-A508-8EBC-BFA883A29759}"/>
+              </a:ext>
+            </a:extLst>
+          </p:cNvPr>
+          <p:cNvCxnSpPr/>
+          <p:nvPr/>
+        </p:nvCxnSpPr>
+        <p:spPr>
+          <a:xfrm>
+            <a:off x="7630626" y="1359437"/>
+            <a:ext cx="0" cy="2016000"/>
+          </a:xfrm>
+          <a:prstGeom prst="line">
+            <a:avLst/>
+          </a:prstGeom>
+          <a:ln>
+            <a:solidFill>
+              <a:schemeClr val="bg1">
+                <a:lumMod val="50000"/>
+              </a:schemeClr>
+            </a:solidFill>
+            <a:prstDash val="dash"/>
+          </a:ln>
+        </p:spPr>
+        <p:style>
+          <a:lnRef idx="1">
+            <a:schemeClr val="accent1"/>
+          </a:lnRef>
+          <a:fillRef idx="0">
+            <a:schemeClr val="accent1"/>
+          </a:fillRef>
+          <a:effectRef idx="0">
+            <a:schemeClr val="accent1"/>
+          </a:effectRef>
+          <a:fontRef idx="minor">
+            <a:schemeClr val="tx1"/>
+          </a:fontRef>
+        </p:style>
+      </p:cxnSp>
+      <p:cxnSp>
+        <p:nvCxnSpPr>
+          <p:cNvPr id="59" name="Straight Connector 58">
+            <a:extLst>
+              <a:ext uri="{FF2B5EF4-FFF2-40B4-BE49-F238E27FC236}">
+                <a16:creationId xmlns:a16="http://schemas.microsoft.com/office/drawing/2014/main" id="{98772DBF-EB99-18C0-F476-F36990138489}"/>
+              </a:ext>
+            </a:extLst>
+          </p:cNvPr>
+          <p:cNvCxnSpPr/>
+          <p:nvPr/>
+        </p:nvCxnSpPr>
+        <p:spPr>
+          <a:xfrm>
+            <a:off x="5828113" y="1366283"/>
+            <a:ext cx="0" cy="2016000"/>
+          </a:xfrm>
+          <a:prstGeom prst="line">
+            <a:avLst/>
+          </a:prstGeom>
+          <a:ln>
+            <a:solidFill>
+              <a:schemeClr val="bg1">
+                <a:lumMod val="50000"/>
+              </a:schemeClr>
+            </a:solidFill>
+            <a:prstDash val="dash"/>
+          </a:ln>
+        </p:spPr>
+        <p:style>
+          <a:lnRef idx="1">
+            <a:schemeClr val="accent1"/>
+          </a:lnRef>
+          <a:fillRef idx="0">
+            <a:schemeClr val="accent1"/>
+          </a:fillRef>
+          <a:effectRef idx="0">
+            <a:schemeClr val="accent1"/>
+          </a:effectRef>
+          <a:fontRef idx="minor">
+            <a:schemeClr val="tx1"/>
+          </a:fontRef>
+        </p:style>
+      </p:cxnSp>
+      <p:cxnSp>
+        <p:nvCxnSpPr>
+          <p:cNvPr id="60" name="Straight Connector 59">
+            <a:extLst>
+              <a:ext uri="{FF2B5EF4-FFF2-40B4-BE49-F238E27FC236}">
+                <a16:creationId xmlns:a16="http://schemas.microsoft.com/office/drawing/2014/main" id="{29F0197C-0277-94CA-6AF6-A3B605139A81}"/>
+              </a:ext>
+            </a:extLst>
+          </p:cNvPr>
+          <p:cNvCxnSpPr/>
+          <p:nvPr/>
+        </p:nvCxnSpPr>
+        <p:spPr>
+          <a:xfrm>
+            <a:off x="4011600" y="1359437"/>
+            <a:ext cx="0" cy="2016000"/>
+          </a:xfrm>
+          <a:prstGeom prst="line">
+            <a:avLst/>
+          </a:prstGeom>
+          <a:ln>
+            <a:solidFill>
+              <a:schemeClr val="bg1">
+                <a:lumMod val="50000"/>
+              </a:schemeClr>
+            </a:solidFill>
+            <a:prstDash val="dash"/>
+          </a:ln>
+        </p:spPr>
+        <p:style>
+          <a:lnRef idx="1">
+            <a:schemeClr val="accent1"/>
+          </a:lnRef>
+          <a:fillRef idx="0">
+            <a:schemeClr val="accent1"/>
+          </a:fillRef>
+          <a:effectRef idx="0">
+            <a:schemeClr val="accent1"/>
+          </a:effectRef>
+          <a:fontRef idx="minor">
+            <a:schemeClr val="tx1"/>
+          </a:fontRef>
+        </p:style>
+      </p:cxnSp>
+      <p:sp>
+        <p:nvSpPr>
+          <p:cNvPr id="61" name="TextBox 60">
+            <a:extLst>
+              <a:ext uri="{FF2B5EF4-FFF2-40B4-BE49-F238E27FC236}">
+                <a16:creationId xmlns:a16="http://schemas.microsoft.com/office/drawing/2014/main" id="{7F2FF8A9-B298-D7AD-13F1-4B6D4D87C828}"/>
+              </a:ext>
+            </a:extLst>
+          </p:cNvPr>
+          <p:cNvSpPr txBox="1"/>
+          <p:nvPr/>
+        </p:nvSpPr>
+        <p:spPr>
+          <a:xfrm>
+            <a:off x="2986201" y="2087428"/>
+            <a:ext cx="1128642" cy="276999"/>
+          </a:xfrm>
+          <a:prstGeom prst="rect">
+            <a:avLst/>
+          </a:prstGeom>
+          <a:noFill/>
+        </p:spPr>
+        <p:txBody>
+          <a:bodyPr wrap="none" rtlCol="0">
+            <a:spAutoFit/>
+          </a:bodyPr>
+          <a:lstStyle/>
+          <a:p>
+            <a:r>
+              <a:rPr lang="en-JP" sz="1200" dirty="0">
+                <a:latin typeface="Arial" panose="020B0604020202020204" pitchFamily="34" charset="0"/>
+                <a:cs typeface="Arial" panose="020B0604020202020204" pitchFamily="34" charset="0"/>
+              </a:rPr>
+              <a:t>AT3G13870.1</a:t>
+            </a:r>
+          </a:p>
+        </p:txBody>
+      </p:sp>
+      <p:sp>
+        <p:nvSpPr>
+          <p:cNvPr id="62" name="TextBox 61">
+            <a:extLst>
+              <a:ext uri="{FF2B5EF4-FFF2-40B4-BE49-F238E27FC236}">
+                <a16:creationId xmlns:a16="http://schemas.microsoft.com/office/drawing/2014/main" id="{2AD16C8A-392F-C031-DCA2-8DAF96588F20}"/>
+              </a:ext>
+            </a:extLst>
+          </p:cNvPr>
+          <p:cNvSpPr txBox="1"/>
+          <p:nvPr/>
+        </p:nvSpPr>
+        <p:spPr>
+          <a:xfrm>
+            <a:off x="2995723" y="2439856"/>
+            <a:ext cx="1128642" cy="276999"/>
+          </a:xfrm>
+          <a:prstGeom prst="rect">
+            <a:avLst/>
+          </a:prstGeom>
+          <a:noFill/>
+        </p:spPr>
+        <p:txBody>
+          <a:bodyPr wrap="none" rtlCol="0">
+            <a:spAutoFit/>
+          </a:bodyPr>
+          <a:lstStyle/>
+          <a:p>
+            <a:r>
+              <a:rPr lang="en-JP" sz="1200" dirty="0">
+                <a:latin typeface="Arial" panose="020B0604020202020204" pitchFamily="34" charset="0"/>
+                <a:cs typeface="Arial" panose="020B0604020202020204" pitchFamily="34" charset="0"/>
+              </a:rPr>
+              <a:t>AT3G13870.2</a:t>
+            </a:r>
+          </a:p>
+        </p:txBody>
+      </p:sp>
+      <p:sp>
+        <p:nvSpPr>
+          <p:cNvPr id="63" name="TextBox 62">
+            <a:extLst>
+              <a:ext uri="{FF2B5EF4-FFF2-40B4-BE49-F238E27FC236}">
+                <a16:creationId xmlns:a16="http://schemas.microsoft.com/office/drawing/2014/main" id="{CCC145BE-7B52-A81D-A68A-7F95F11B5BAB}"/>
+              </a:ext>
+            </a:extLst>
+          </p:cNvPr>
+          <p:cNvSpPr txBox="1"/>
+          <p:nvPr/>
+        </p:nvSpPr>
+        <p:spPr>
+          <a:xfrm>
+            <a:off x="4079010" y="1722058"/>
+            <a:ext cx="601447" cy="276999"/>
+          </a:xfrm>
+          <a:prstGeom prst="rect">
+            <a:avLst/>
+          </a:prstGeom>
+          <a:noFill/>
+        </p:spPr>
+        <p:txBody>
+          <a:bodyPr wrap="none" rtlCol="0">
+            <a:spAutoFit/>
+          </a:bodyPr>
+          <a:lstStyle/>
+          <a:p>
+            <a:r>
+              <a:rPr lang="en-JP" sz="1200" b="1" i="1" dirty="0">
+                <a:latin typeface="Arial" panose="020B0604020202020204" pitchFamily="34" charset="0"/>
+                <a:cs typeface="Arial" panose="020B0604020202020204" pitchFamily="34" charset="0"/>
+              </a:rPr>
+              <a:t>RHD3</a:t>
+            </a:r>
+          </a:p>
+        </p:txBody>
+      </p:sp>
+      <p:sp>
+        <p:nvSpPr>
+          <p:cNvPr id="64" name="TextBox 63">
+            <a:extLst>
+              <a:ext uri="{FF2B5EF4-FFF2-40B4-BE49-F238E27FC236}">
+                <a16:creationId xmlns:a16="http://schemas.microsoft.com/office/drawing/2014/main" id="{84C7D681-C99B-335D-1C05-1A479DC3ADC2}"/>
+              </a:ext>
+            </a:extLst>
+          </p:cNvPr>
+          <p:cNvSpPr txBox="1"/>
+          <p:nvPr/>
+        </p:nvSpPr>
+        <p:spPr>
+          <a:xfrm>
+            <a:off x="5055985" y="1766212"/>
+            <a:ext cx="1128642" cy="276999"/>
+          </a:xfrm>
+          <a:prstGeom prst="rect">
+            <a:avLst/>
+          </a:prstGeom>
+          <a:noFill/>
+        </p:spPr>
+        <p:txBody>
+          <a:bodyPr wrap="none" rtlCol="0">
+            <a:spAutoFit/>
+          </a:bodyPr>
+          <a:lstStyle/>
+          <a:p>
+            <a:r>
+              <a:rPr lang="en-JP" sz="1200" dirty="0">
+                <a:latin typeface="Arial" panose="020B0604020202020204" pitchFamily="34" charset="0"/>
+                <a:cs typeface="Arial" panose="020B0604020202020204" pitchFamily="34" charset="0"/>
+              </a:rPr>
+              <a:t>AT3G13880.1</a:t>
+            </a:r>
+          </a:p>
+        </p:txBody>
+      </p:sp>
+      <p:sp>
+        <p:nvSpPr>
+          <p:cNvPr id="65" name="TextBox 64">
+            <a:extLst>
+              <a:ext uri="{FF2B5EF4-FFF2-40B4-BE49-F238E27FC236}">
+                <a16:creationId xmlns:a16="http://schemas.microsoft.com/office/drawing/2014/main" id="{B1892F93-38B4-8D52-0994-F34BD47D0327}"/>
+              </a:ext>
+            </a:extLst>
+          </p:cNvPr>
+          <p:cNvSpPr txBox="1"/>
+          <p:nvPr/>
+        </p:nvSpPr>
+        <p:spPr>
+          <a:xfrm>
+            <a:off x="5246624" y="1402194"/>
+            <a:ext cx="671979" cy="276999"/>
+          </a:xfrm>
+          <a:prstGeom prst="rect">
+            <a:avLst/>
+          </a:prstGeom>
+          <a:noFill/>
+        </p:spPr>
+        <p:txBody>
+          <a:bodyPr wrap="none" rtlCol="0">
+            <a:spAutoFit/>
+          </a:bodyPr>
+          <a:lstStyle/>
+          <a:p>
+            <a:r>
+              <a:rPr lang="en-JP" sz="1200" b="1" i="1" dirty="0">
+                <a:latin typeface="Arial" panose="020B0604020202020204" pitchFamily="34" charset="0"/>
+                <a:cs typeface="Arial" panose="020B0604020202020204" pitchFamily="34" charset="0"/>
+              </a:rPr>
+              <a:t>OTP72</a:t>
+            </a:r>
+          </a:p>
+        </p:txBody>
+      </p:sp>
+      <p:sp>
+        <p:nvSpPr>
+          <p:cNvPr id="66" name="TextBox 65">
+            <a:extLst>
+              <a:ext uri="{FF2B5EF4-FFF2-40B4-BE49-F238E27FC236}">
+                <a16:creationId xmlns:a16="http://schemas.microsoft.com/office/drawing/2014/main" id="{5E1EA857-302F-65D5-C6BB-EA769EF98694}"/>
+              </a:ext>
+            </a:extLst>
+          </p:cNvPr>
+          <p:cNvSpPr txBox="1"/>
+          <p:nvPr/>
+        </p:nvSpPr>
+        <p:spPr>
+          <a:xfrm>
+            <a:off x="5425243" y="2102647"/>
+            <a:ext cx="1128642" cy="276999"/>
+          </a:xfrm>
+          <a:prstGeom prst="rect">
+            <a:avLst/>
+          </a:prstGeom>
+          <a:noFill/>
+        </p:spPr>
+        <p:txBody>
+          <a:bodyPr wrap="none" rtlCol="0">
+            <a:spAutoFit/>
+          </a:bodyPr>
+          <a:lstStyle/>
+          <a:p>
+            <a:r>
+              <a:rPr lang="en-JP" sz="1200" dirty="0">
+                <a:solidFill>
+                  <a:srgbClr val="FF0000"/>
+                </a:solidFill>
+                <a:latin typeface="Arial" panose="020B0604020202020204" pitchFamily="34" charset="0"/>
+                <a:cs typeface="Arial" panose="020B0604020202020204" pitchFamily="34" charset="0"/>
+              </a:rPr>
+              <a:t>AT3G13882.1</a:t>
+            </a:r>
+          </a:p>
+        </p:txBody>
+      </p:sp>
+      <p:sp>
+        <p:nvSpPr>
+          <p:cNvPr id="67" name="TextBox 66">
+            <a:extLst>
+              <a:ext uri="{FF2B5EF4-FFF2-40B4-BE49-F238E27FC236}">
+                <a16:creationId xmlns:a16="http://schemas.microsoft.com/office/drawing/2014/main" id="{A7315CB5-4B90-D92E-3ACF-D345F39C9861}"/>
+              </a:ext>
+            </a:extLst>
+          </p:cNvPr>
+          <p:cNvSpPr txBox="1"/>
+          <p:nvPr/>
+        </p:nvSpPr>
+        <p:spPr>
+          <a:xfrm>
+            <a:off x="5434766" y="2469367"/>
+            <a:ext cx="1128642" cy="276999"/>
+          </a:xfrm>
+          <a:prstGeom prst="rect">
+            <a:avLst/>
+          </a:prstGeom>
+          <a:noFill/>
+        </p:spPr>
+        <p:txBody>
+          <a:bodyPr wrap="none" rtlCol="0">
+            <a:spAutoFit/>
+          </a:bodyPr>
+          <a:lstStyle/>
+          <a:p>
+            <a:r>
+              <a:rPr lang="en-JP" sz="1200" dirty="0">
+                <a:solidFill>
+                  <a:srgbClr val="FF0000"/>
+                </a:solidFill>
+                <a:latin typeface="Arial" panose="020B0604020202020204" pitchFamily="34" charset="0"/>
+                <a:cs typeface="Arial" panose="020B0604020202020204" pitchFamily="34" charset="0"/>
+              </a:rPr>
+              <a:t>AT3G13882.2</a:t>
+            </a:r>
+          </a:p>
+        </p:txBody>
+      </p:sp>
+      <p:sp>
+        <p:nvSpPr>
+          <p:cNvPr id="68" name="TextBox 67">
+            <a:extLst>
+              <a:ext uri="{FF2B5EF4-FFF2-40B4-BE49-F238E27FC236}">
+                <a16:creationId xmlns:a16="http://schemas.microsoft.com/office/drawing/2014/main" id="{C605DD34-1E9D-D88C-FA82-F0702FE4B78D}"/>
+              </a:ext>
+            </a:extLst>
+          </p:cNvPr>
+          <p:cNvSpPr txBox="1"/>
+          <p:nvPr/>
+        </p:nvSpPr>
+        <p:spPr>
+          <a:xfrm>
+            <a:off x="6513285" y="1765185"/>
+            <a:ext cx="1128642" cy="276999"/>
+          </a:xfrm>
+          <a:prstGeom prst="rect">
+            <a:avLst/>
+          </a:prstGeom>
+          <a:noFill/>
+        </p:spPr>
+        <p:txBody>
+          <a:bodyPr wrap="none" rtlCol="0">
+            <a:spAutoFit/>
+          </a:bodyPr>
+          <a:lstStyle/>
+          <a:p>
+            <a:r>
+              <a:rPr lang="en-JP" sz="1200" dirty="0">
+                <a:solidFill>
+                  <a:srgbClr val="FF0000"/>
+                </a:solidFill>
+                <a:latin typeface="Arial" panose="020B0604020202020204" pitchFamily="34" charset="0"/>
+                <a:cs typeface="Arial" panose="020B0604020202020204" pitchFamily="34" charset="0"/>
+              </a:rPr>
+              <a:t>AT3G13890.1</a:t>
+            </a:r>
+          </a:p>
+        </p:txBody>
+      </p:sp>
+      <p:sp>
+        <p:nvSpPr>
+          <p:cNvPr id="69" name="TextBox 68">
+            <a:extLst>
+              <a:ext uri="{FF2B5EF4-FFF2-40B4-BE49-F238E27FC236}">
+                <a16:creationId xmlns:a16="http://schemas.microsoft.com/office/drawing/2014/main" id="{B10BB8D6-0DDB-7CE0-1D75-771104983351}"/>
+              </a:ext>
+            </a:extLst>
+          </p:cNvPr>
+          <p:cNvSpPr txBox="1"/>
+          <p:nvPr/>
+        </p:nvSpPr>
+        <p:spPr>
+          <a:xfrm>
+            <a:off x="6522932" y="2074073"/>
+            <a:ext cx="1128642" cy="276999"/>
+          </a:xfrm>
+          <a:prstGeom prst="rect">
+            <a:avLst/>
+          </a:prstGeom>
+          <a:noFill/>
+        </p:spPr>
+        <p:txBody>
+          <a:bodyPr wrap="none" rtlCol="0">
+            <a:spAutoFit/>
+          </a:bodyPr>
+          <a:lstStyle/>
+          <a:p>
+            <a:r>
+              <a:rPr lang="en-JP" sz="1200" dirty="0">
+                <a:solidFill>
+                  <a:srgbClr val="FF0000"/>
+                </a:solidFill>
+                <a:latin typeface="Arial" panose="020B0604020202020204" pitchFamily="34" charset="0"/>
+                <a:cs typeface="Arial" panose="020B0604020202020204" pitchFamily="34" charset="0"/>
+              </a:rPr>
+              <a:t>AT3G13890.2</a:t>
+            </a:r>
+          </a:p>
+        </p:txBody>
+      </p:sp>
+      <p:sp>
+        <p:nvSpPr>
+          <p:cNvPr id="70" name="TextBox 69">
+            <a:extLst>
+              <a:ext uri="{FF2B5EF4-FFF2-40B4-BE49-F238E27FC236}">
+                <a16:creationId xmlns:a16="http://schemas.microsoft.com/office/drawing/2014/main" id="{C0F9224E-9896-5B6A-CE28-C5DC137A6972}"/>
+              </a:ext>
+            </a:extLst>
+          </p:cNvPr>
+          <p:cNvSpPr txBox="1"/>
+          <p:nvPr/>
+        </p:nvSpPr>
+        <p:spPr>
+          <a:xfrm>
+            <a:off x="6640244" y="1412308"/>
+            <a:ext cx="696024" cy="276999"/>
+          </a:xfrm>
+          <a:prstGeom prst="rect">
+            <a:avLst/>
+          </a:prstGeom>
+          <a:noFill/>
+        </p:spPr>
+        <p:txBody>
+          <a:bodyPr wrap="none" rtlCol="0">
+            <a:spAutoFit/>
+          </a:bodyPr>
+          <a:lstStyle/>
+          <a:p>
+            <a:r>
+              <a:rPr lang="en-JP" sz="1200" b="1" i="1" dirty="0">
+                <a:solidFill>
+                  <a:srgbClr val="FF0000"/>
+                </a:solidFill>
+                <a:latin typeface="Arial" panose="020B0604020202020204" pitchFamily="34" charset="0"/>
+                <a:cs typeface="Arial" panose="020B0604020202020204" pitchFamily="34" charset="0"/>
+              </a:rPr>
+              <a:t>MYB26</a:t>
+            </a:r>
+          </a:p>
+        </p:txBody>
+      </p:sp>
+      <p:sp>
+        <p:nvSpPr>
+          <p:cNvPr id="71" name="TextBox 70">
+            <a:extLst>
+              <a:ext uri="{FF2B5EF4-FFF2-40B4-BE49-F238E27FC236}">
+                <a16:creationId xmlns:a16="http://schemas.microsoft.com/office/drawing/2014/main" id="{D69A28AA-2766-D28D-F994-6B01AAF1689F}"/>
+              </a:ext>
+            </a:extLst>
+          </p:cNvPr>
+          <p:cNvSpPr txBox="1"/>
+          <p:nvPr/>
+        </p:nvSpPr>
+        <p:spPr>
+          <a:xfrm>
+            <a:off x="2162466" y="1762499"/>
+            <a:ext cx="1128642" cy="276999"/>
+          </a:xfrm>
+          <a:prstGeom prst="rect">
+            <a:avLst/>
+          </a:prstGeom>
+          <a:noFill/>
+        </p:spPr>
+        <p:txBody>
+          <a:bodyPr wrap="none" rtlCol="0">
+            <a:spAutoFit/>
+          </a:bodyPr>
+          <a:lstStyle/>
+          <a:p>
+            <a:r>
+              <a:rPr lang="en-JP" sz="1200" dirty="0">
+                <a:latin typeface="Arial" panose="020B0604020202020204" pitchFamily="34" charset="0"/>
+                <a:cs typeface="Arial" panose="020B0604020202020204" pitchFamily="34" charset="0"/>
+              </a:rPr>
+              <a:t>AT3G13860.1</a:t>
+            </a:r>
+          </a:p>
+        </p:txBody>
+      </p:sp>
+      <p:sp>
+        <p:nvSpPr>
+          <p:cNvPr id="72" name="TextBox 71">
+            <a:extLst>
+              <a:ext uri="{FF2B5EF4-FFF2-40B4-BE49-F238E27FC236}">
+                <a16:creationId xmlns:a16="http://schemas.microsoft.com/office/drawing/2014/main" id="{3CED43A6-72B3-DEF4-C409-1D82F3090E36}"/>
+              </a:ext>
+            </a:extLst>
+          </p:cNvPr>
+          <p:cNvSpPr txBox="1"/>
+          <p:nvPr/>
+        </p:nvSpPr>
+        <p:spPr>
+          <a:xfrm>
+            <a:off x="8122207" y="1747657"/>
+            <a:ext cx="1128642" cy="276999"/>
+          </a:xfrm>
+          <a:prstGeom prst="rect">
+            <a:avLst/>
+          </a:prstGeom>
+          <a:noFill/>
+        </p:spPr>
+        <p:txBody>
+          <a:bodyPr wrap="none" rtlCol="0">
+            <a:spAutoFit/>
+          </a:bodyPr>
+          <a:lstStyle/>
+          <a:p>
+            <a:r>
+              <a:rPr lang="en-JP" sz="1200" dirty="0">
+                <a:solidFill>
+                  <a:srgbClr val="FF0000"/>
+                </a:solidFill>
+                <a:latin typeface="Arial" panose="020B0604020202020204" pitchFamily="34" charset="0"/>
+                <a:cs typeface="Arial" panose="020B0604020202020204" pitchFamily="34" charset="0"/>
+              </a:rPr>
+              <a:t>AT3G13898.1</a:t>
+            </a:r>
+          </a:p>
+        </p:txBody>
+      </p:sp>
+      <p:sp>
+        <p:nvSpPr>
+          <p:cNvPr id="73" name="TextBox 72">
+            <a:extLst>
+              <a:ext uri="{FF2B5EF4-FFF2-40B4-BE49-F238E27FC236}">
+                <a16:creationId xmlns:a16="http://schemas.microsoft.com/office/drawing/2014/main" id="{70F9CB74-5A92-6520-C887-1BCBC0E6DE9A}"/>
+              </a:ext>
+            </a:extLst>
+          </p:cNvPr>
+          <p:cNvSpPr txBox="1"/>
+          <p:nvPr/>
+        </p:nvSpPr>
+        <p:spPr>
+          <a:xfrm>
+            <a:off x="9314182" y="1731375"/>
+            <a:ext cx="1128642" cy="276999"/>
+          </a:xfrm>
+          <a:prstGeom prst="rect">
+            <a:avLst/>
+          </a:prstGeom>
+          <a:noFill/>
+        </p:spPr>
+        <p:txBody>
+          <a:bodyPr wrap="none" rtlCol="0">
+            <a:spAutoFit/>
+          </a:bodyPr>
+          <a:lstStyle/>
+          <a:p>
+            <a:r>
+              <a:rPr lang="en-JP" sz="1200" dirty="0">
+                <a:latin typeface="Arial" panose="020B0604020202020204" pitchFamily="34" charset="0"/>
+                <a:cs typeface="Arial" panose="020B0604020202020204" pitchFamily="34" charset="0"/>
+              </a:rPr>
+              <a:t>AT3G13900.1</a:t>
+            </a:r>
+          </a:p>
+        </p:txBody>
+      </p:sp>
+      <p:sp>
+        <p:nvSpPr>
+          <p:cNvPr id="74" name="TextBox 73">
+            <a:extLst>
+              <a:ext uri="{FF2B5EF4-FFF2-40B4-BE49-F238E27FC236}">
+                <a16:creationId xmlns:a16="http://schemas.microsoft.com/office/drawing/2014/main" id="{E21AB324-8A89-164A-F3A6-AFF3844FD82D}"/>
+              </a:ext>
+            </a:extLst>
+          </p:cNvPr>
+          <p:cNvSpPr txBox="1"/>
+          <p:nvPr/>
+        </p:nvSpPr>
+        <p:spPr>
+          <a:xfrm>
+            <a:off x="9466582" y="2069516"/>
+            <a:ext cx="1128642" cy="276999"/>
+          </a:xfrm>
+          <a:prstGeom prst="rect">
+            <a:avLst/>
+          </a:prstGeom>
+          <a:noFill/>
+        </p:spPr>
+        <p:txBody>
+          <a:bodyPr wrap="none" rtlCol="0">
+            <a:spAutoFit/>
+          </a:bodyPr>
+          <a:lstStyle/>
+          <a:p>
+            <a:r>
+              <a:rPr lang="en-JP" sz="1200" dirty="0">
+                <a:latin typeface="Arial" panose="020B0604020202020204" pitchFamily="34" charset="0"/>
+                <a:cs typeface="Arial" panose="020B0604020202020204" pitchFamily="34" charset="0"/>
+              </a:rPr>
+              <a:t>AT3G13900.2</a:t>
+            </a:r>
+          </a:p>
+        </p:txBody>
+      </p:sp>
+      <p:sp>
+        <p:nvSpPr>
+          <p:cNvPr id="75" name="TextBox 74">
+            <a:extLst>
+              <a:ext uri="{FF2B5EF4-FFF2-40B4-BE49-F238E27FC236}">
+                <a16:creationId xmlns:a16="http://schemas.microsoft.com/office/drawing/2014/main" id="{1EAF3AF6-DEDE-1338-8C71-BDE7F1132DAF}"/>
+              </a:ext>
+            </a:extLst>
+          </p:cNvPr>
+          <p:cNvSpPr txBox="1"/>
+          <p:nvPr/>
+        </p:nvSpPr>
+        <p:spPr>
+          <a:xfrm>
+            <a:off x="9476104" y="2407656"/>
+            <a:ext cx="1128642" cy="276999"/>
+          </a:xfrm>
+          <a:prstGeom prst="rect">
+            <a:avLst/>
+          </a:prstGeom>
+          <a:noFill/>
+        </p:spPr>
+        <p:txBody>
+          <a:bodyPr wrap="none" rtlCol="0">
+            <a:spAutoFit/>
+          </a:bodyPr>
+          <a:lstStyle/>
+          <a:p>
+            <a:r>
+              <a:rPr lang="en-JP" sz="1200" dirty="0">
+                <a:latin typeface="Arial" panose="020B0604020202020204" pitchFamily="34" charset="0"/>
+                <a:cs typeface="Arial" panose="020B0604020202020204" pitchFamily="34" charset="0"/>
+              </a:rPr>
+              <a:t>AT3G13900.3</a:t>
+            </a:r>
+          </a:p>
+        </p:txBody>
+      </p:sp>
+      <p:sp>
+        <p:nvSpPr>
+          <p:cNvPr id="76" name="TextBox 75">
+            <a:extLst>
+              <a:ext uri="{FF2B5EF4-FFF2-40B4-BE49-F238E27FC236}">
+                <a16:creationId xmlns:a16="http://schemas.microsoft.com/office/drawing/2014/main" id="{C5930510-CE41-FE97-2D6C-2ED0AA9C2694}"/>
+              </a:ext>
+            </a:extLst>
+          </p:cNvPr>
+          <p:cNvSpPr txBox="1"/>
+          <p:nvPr/>
+        </p:nvSpPr>
+        <p:spPr>
+          <a:xfrm>
+            <a:off x="10231120" y="2746050"/>
+            <a:ext cx="1128642" cy="276999"/>
+          </a:xfrm>
+          <a:prstGeom prst="rect">
+            <a:avLst/>
+          </a:prstGeom>
+          <a:noFill/>
+        </p:spPr>
+        <p:txBody>
+          <a:bodyPr wrap="none" rtlCol="0">
+            <a:spAutoFit/>
+          </a:bodyPr>
+          <a:lstStyle/>
+          <a:p>
+            <a:r>
+              <a:rPr lang="en-JP" sz="1200" dirty="0">
+                <a:latin typeface="Arial" panose="020B0604020202020204" pitchFamily="34" charset="0"/>
+                <a:cs typeface="Arial" panose="020B0604020202020204" pitchFamily="34" charset="0"/>
+              </a:rPr>
+              <a:t>AT3G13910.1</a:t>
+            </a:r>
+          </a:p>
+        </p:txBody>
+      </p:sp>
+      <p:sp>
+        <p:nvSpPr>
+          <p:cNvPr id="77" name="TextBox 76">
+            <a:extLst>
+              <a:ext uri="{FF2B5EF4-FFF2-40B4-BE49-F238E27FC236}">
+                <a16:creationId xmlns:a16="http://schemas.microsoft.com/office/drawing/2014/main" id="{1AE53AD9-074A-C04F-4EA7-383393BBE5CE}"/>
+              </a:ext>
+            </a:extLst>
+          </p:cNvPr>
+          <p:cNvSpPr txBox="1"/>
+          <p:nvPr/>
+        </p:nvSpPr>
+        <p:spPr>
+          <a:xfrm>
+            <a:off x="10240858" y="3084074"/>
+            <a:ext cx="1128642" cy="276999"/>
+          </a:xfrm>
+          <a:prstGeom prst="rect">
+            <a:avLst/>
+          </a:prstGeom>
+          <a:noFill/>
+        </p:spPr>
+        <p:txBody>
+          <a:bodyPr wrap="none" rtlCol="0">
+            <a:spAutoFit/>
+          </a:bodyPr>
+          <a:lstStyle/>
+          <a:p>
+            <a:r>
+              <a:rPr lang="en-JP" sz="1200" dirty="0">
+                <a:latin typeface="Arial" panose="020B0604020202020204" pitchFamily="34" charset="0"/>
+                <a:cs typeface="Arial" panose="020B0604020202020204" pitchFamily="34" charset="0"/>
+              </a:rPr>
+              <a:t>AT3G13920.1</a:t>
+            </a:r>
+          </a:p>
+        </p:txBody>
+      </p:sp>
+      <p:sp>
+        <p:nvSpPr>
+          <p:cNvPr id="81" name="TextBox 80">
+            <a:extLst>
+              <a:ext uri="{FF2B5EF4-FFF2-40B4-BE49-F238E27FC236}">
+                <a16:creationId xmlns:a16="http://schemas.microsoft.com/office/drawing/2014/main" id="{2EA12858-C306-A72F-1C48-0437AE9DCC1A}"/>
+              </a:ext>
+            </a:extLst>
+          </p:cNvPr>
+          <p:cNvSpPr txBox="1"/>
+          <p:nvPr/>
+        </p:nvSpPr>
+        <p:spPr>
+          <a:xfrm>
+            <a:off x="6761397" y="3484995"/>
+            <a:ext cx="779381" cy="276999"/>
+          </a:xfrm>
+          <a:prstGeom prst="rect">
+            <a:avLst/>
+          </a:prstGeom>
+          <a:noFill/>
+        </p:spPr>
+        <p:txBody>
+          <a:bodyPr wrap="none" rtlCol="0">
+            <a:spAutoFit/>
+          </a:bodyPr>
+          <a:lstStyle/>
+          <a:p>
+            <a:r>
+              <a:rPr lang="en-JP" sz="1200" dirty="0">
+                <a:solidFill>
+                  <a:srgbClr val="FF0000"/>
+                </a:solidFill>
+                <a:latin typeface="Arial" panose="020B0604020202020204" pitchFamily="34" charset="0"/>
+                <a:cs typeface="Arial" panose="020B0604020202020204" pitchFamily="34" charset="0"/>
+              </a:rPr>
+              <a:t>4579292</a:t>
+            </a:r>
+          </a:p>
+        </p:txBody>
+      </p:sp>
+      <p:sp>
+        <p:nvSpPr>
+          <p:cNvPr id="15" name="TextBox 14">
+            <a:extLst>
+              <a:ext uri="{FF2B5EF4-FFF2-40B4-BE49-F238E27FC236}">
+                <a16:creationId xmlns:a16="http://schemas.microsoft.com/office/drawing/2014/main" id="{B2876B03-F116-D6BF-49F4-F35D6801561B}"/>
+              </a:ext>
+            </a:extLst>
+          </p:cNvPr>
+          <p:cNvSpPr txBox="1"/>
+          <p:nvPr/>
+        </p:nvSpPr>
+        <p:spPr>
+          <a:xfrm>
+            <a:off x="1575331" y="868669"/>
+            <a:ext cx="466794" cy="369332"/>
+          </a:xfrm>
+          <a:prstGeom prst="rect">
+            <a:avLst/>
+          </a:prstGeom>
+          <a:noFill/>
+        </p:spPr>
+        <p:txBody>
+          <a:bodyPr wrap="none" rtlCol="0">
+            <a:spAutoFit/>
+          </a:bodyPr>
+          <a:lstStyle/>
+          <a:p>
+            <a:r>
+              <a:rPr lang="en-JP" dirty="0">
+                <a:latin typeface="Arial" panose="020B0604020202020204" pitchFamily="34" charset="0"/>
+                <a:cs typeface="Arial" panose="020B0604020202020204" pitchFamily="34" charset="0"/>
+              </a:rPr>
+              <a:t>(a)</a:t>
+            </a:r>
+          </a:p>
+        </p:txBody>
+      </p:sp>
+      <p:sp>
+        <p:nvSpPr>
+          <p:cNvPr id="20" name="TextBox 19">
+            <a:extLst>
+              <a:ext uri="{FF2B5EF4-FFF2-40B4-BE49-F238E27FC236}">
+                <a16:creationId xmlns:a16="http://schemas.microsoft.com/office/drawing/2014/main" id="{C6EA70DD-CCB8-B9A0-C9AF-17CC9FCC76F7}"/>
+              </a:ext>
+            </a:extLst>
+          </p:cNvPr>
+          <p:cNvSpPr txBox="1"/>
+          <p:nvPr/>
+        </p:nvSpPr>
+        <p:spPr>
+          <a:xfrm>
+            <a:off x="1583139" y="3616090"/>
+            <a:ext cx="466794" cy="369332"/>
+          </a:xfrm>
+          <a:prstGeom prst="rect">
+            <a:avLst/>
+          </a:prstGeom>
+          <a:noFill/>
+        </p:spPr>
+        <p:txBody>
+          <a:bodyPr wrap="none" rtlCol="0">
+            <a:spAutoFit/>
+          </a:bodyPr>
+          <a:lstStyle/>
+          <a:p>
+            <a:r>
+              <a:rPr lang="en-JP" dirty="0">
+                <a:latin typeface="Arial" panose="020B0604020202020204" pitchFamily="34" charset="0"/>
+                <a:cs typeface="Arial" panose="020B0604020202020204" pitchFamily="34" charset="0"/>
+              </a:rPr>
+              <a:t>(b)</a:t>
+            </a:r>
+          </a:p>
+        </p:txBody>
+      </p:sp>
+      <p:sp>
+        <p:nvSpPr>
+          <p:cNvPr id="25" name="TextBox 24">
+            <a:extLst>
+              <a:ext uri="{FF2B5EF4-FFF2-40B4-BE49-F238E27FC236}">
+                <a16:creationId xmlns:a16="http://schemas.microsoft.com/office/drawing/2014/main" id="{E0D68228-C7AE-50C6-1BFB-134CCA4BAC10}"/>
+              </a:ext>
+            </a:extLst>
+          </p:cNvPr>
+          <p:cNvSpPr txBox="1"/>
+          <p:nvPr/>
+        </p:nvSpPr>
+        <p:spPr>
+          <a:xfrm>
+            <a:off x="8485078" y="3645415"/>
+            <a:ext cx="453970" cy="369332"/>
+          </a:xfrm>
+          <a:prstGeom prst="rect">
+            <a:avLst/>
+          </a:prstGeom>
+          <a:noFill/>
+        </p:spPr>
+        <p:txBody>
+          <a:bodyPr wrap="none" rtlCol="0">
+            <a:spAutoFit/>
+          </a:bodyPr>
+          <a:lstStyle/>
+          <a:p>
+            <a:r>
+              <a:rPr lang="en-JP" dirty="0">
+                <a:latin typeface="Arial" panose="020B0604020202020204" pitchFamily="34" charset="0"/>
+                <a:cs typeface="Arial" panose="020B0604020202020204" pitchFamily="34" charset="0"/>
+              </a:rPr>
+              <a:t>(c)</a:t>
+            </a:r>
+          </a:p>
+        </p:txBody>
+      </p:sp>
+    </p:spTree>
+    <p:extLst>
+      <p:ext uri="{BB962C8B-B14F-4D97-AF65-F5344CB8AC3E}">
+        <p14:creationId xmlns:p14="http://schemas.microsoft.com/office/powerpoint/2010/main" val="2503940556"/>
+      </p:ext>
+    </p:extLst>
+  </p:cSld>
+  <p:clrMapOvr>
+    <a:masterClrMapping/>
+  </p:clrMapOvr>
+</p:sld>
+</file>
+
+<file path=ppt/slides/slide7.xml><?xml version="1.0" encoding="utf-8"?>
 <p:sld xmlns:a="http://schemas.openxmlformats.org/drawingml/2006/main" xmlns:r="http://schemas.openxmlformats.org/officeDocument/2006/relationships" xmlns:p="http://schemas.openxmlformats.org/presentationml/2006/main">
   <p:cSld>
     <p:spTree>

</xml_diff>

<commit_message>
ms revision on 20220828-2
</commit_message>
<xml_diff>
--- a/figures/database_snapshot.pptx
+++ b/figures/database_snapshot.pptx
@@ -3578,7 +3578,7 @@
         </p:blipFill>
         <p:spPr>
           <a:xfrm>
-            <a:off x="0" y="3182112"/>
+            <a:off x="0" y="438912"/>
             <a:ext cx="12192000" cy="3669792"/>
           </a:xfrm>
           <a:prstGeom prst="rect">
@@ -3607,7 +3607,7 @@
         </p:blipFill>
         <p:spPr>
           <a:xfrm>
-            <a:off x="12192" y="64439"/>
+            <a:off x="11575" y="4159931"/>
             <a:ext cx="5400000" cy="2995753"/>
           </a:xfrm>
           <a:prstGeom prst="rect">
@@ -3629,8 +3629,8 @@
         </p:nvSpPr>
         <p:spPr>
           <a:xfrm>
-            <a:off x="109728" y="158496"/>
-            <a:ext cx="436338" cy="369332"/>
+            <a:off x="109728" y="48768"/>
+            <a:ext cx="317716" cy="369332"/>
           </a:xfrm>
           <a:prstGeom prst="rect">
             <a:avLst/>
@@ -3645,7 +3645,7 @@
           <a:p>
             <a:r>
               <a:rPr lang="en-JP" dirty="0"/>
-              <a:t>(a)</a:t>
+              <a:t>A</a:t>
             </a:r>
           </a:p>
         </p:txBody>
@@ -3664,8 +3664,8 @@
         </p:nvSpPr>
         <p:spPr>
           <a:xfrm>
-            <a:off x="109728" y="2704838"/>
-            <a:ext cx="447558" cy="369332"/>
+            <a:off x="144287" y="4270247"/>
+            <a:ext cx="338554" cy="369332"/>
           </a:xfrm>
           <a:prstGeom prst="rect">
             <a:avLst/>
@@ -3679,8 +3679,11 @@
           <a:lstStyle/>
           <a:p>
             <a:r>
-              <a:rPr lang="en-JP" dirty="0"/>
-              <a:t>(b)</a:t>
+              <a:rPr lang="en-JP" dirty="0">
+                <a:latin typeface="Arial" panose="020B0604020202020204" pitchFamily="34" charset="0"/>
+                <a:cs typeface="Arial" panose="020B0604020202020204" pitchFamily="34" charset="0"/>
+              </a:rPr>
+              <a:t>B</a:t>
             </a:r>
           </a:p>
         </p:txBody>
@@ -3699,8 +3702,8 @@
         </p:nvSpPr>
         <p:spPr>
           <a:xfrm rot="16200000">
-            <a:off x="-419960" y="1446788"/>
-            <a:ext cx="1460656" cy="307777"/>
+            <a:off x="-485051" y="5507555"/>
+            <a:ext cx="1566454" cy="307777"/>
           </a:xfrm>
           <a:prstGeom prst="rect">
             <a:avLst/>
@@ -3716,11 +3719,17 @@
           <a:lstStyle/>
           <a:p>
             <a:r>
-              <a:rPr lang="en-US" sz="1400" dirty="0"/>
+              <a:rPr lang="en-US" sz="1400" dirty="0">
+                <a:latin typeface="Arial" panose="020B0604020202020204" pitchFamily="34" charset="0"/>
+                <a:cs typeface="Arial" panose="020B0604020202020204" pitchFamily="34" charset="0"/>
+              </a:rPr>
               <a:t>l</a:t>
             </a:r>
             <a:r>
-              <a:rPr lang="en-JP" sz="1400" dirty="0"/>
+              <a:rPr lang="en-JP" sz="1400" dirty="0">
+                <a:latin typeface="Arial" panose="020B0604020202020204" pitchFamily="34" charset="0"/>
+                <a:cs typeface="Arial" panose="020B0604020202020204" pitchFamily="34" charset="0"/>
+              </a:rPr>
               <a:t>og(no. of aphids)</a:t>
             </a:r>
           </a:p>
@@ -6174,7 +6183,7 @@
                 <a:latin typeface="Arial" panose="020B0604020202020204" pitchFamily="34" charset="0"/>
                 <a:cs typeface="Arial" panose="020B0604020202020204" pitchFamily="34" charset="0"/>
               </a:rPr>
-              <a:t>AT3G13920.1</a:t>
+              <a:t>AT3G13910.2</a:t>
             </a:r>
           </a:p>
         </p:txBody>
@@ -7929,7 +7938,7 @@
                 <a:latin typeface="Arial" panose="020B0604020202020204" pitchFamily="34" charset="0"/>
                 <a:cs typeface="Arial" panose="020B0604020202020204" pitchFamily="34" charset="0"/>
               </a:rPr>
-              <a:t>AT3G13920.1</a:t>
+              <a:t>AT3G13910.2</a:t>
             </a:r>
           </a:p>
         </p:txBody>
@@ -7990,7 +7999,7 @@
         <p:spPr>
           <a:xfrm>
             <a:off x="1575331" y="868669"/>
-            <a:ext cx="466794" cy="369332"/>
+            <a:ext cx="338554" cy="369332"/>
           </a:xfrm>
           <a:prstGeom prst="rect">
             <a:avLst/>
@@ -8008,7 +8017,7 @@
                 <a:latin typeface="Arial" panose="020B0604020202020204" pitchFamily="34" charset="0"/>
                 <a:cs typeface="Arial" panose="020B0604020202020204" pitchFamily="34" charset="0"/>
               </a:rPr>
-              <a:t>(a)</a:t>
+              <a:t>A</a:t>
             </a:r>
           </a:p>
         </p:txBody>
@@ -8028,7 +8037,7 @@
         <p:spPr>
           <a:xfrm>
             <a:off x="1583139" y="3616090"/>
-            <a:ext cx="466794" cy="369332"/>
+            <a:ext cx="338554" cy="369332"/>
           </a:xfrm>
           <a:prstGeom prst="rect">
             <a:avLst/>
@@ -8046,7 +8055,7 @@
                 <a:latin typeface="Arial" panose="020B0604020202020204" pitchFamily="34" charset="0"/>
                 <a:cs typeface="Arial" panose="020B0604020202020204" pitchFamily="34" charset="0"/>
               </a:rPr>
-              <a:t>(b)</a:t>
+              <a:t>B</a:t>
             </a:r>
           </a:p>
         </p:txBody>
@@ -8066,7 +8075,7 @@
         <p:spPr>
           <a:xfrm>
             <a:off x="8485078" y="3645415"/>
-            <a:ext cx="453970" cy="369332"/>
+            <a:ext cx="351378" cy="369332"/>
           </a:xfrm>
           <a:prstGeom prst="rect">
             <a:avLst/>
@@ -8084,7 +8093,7 @@
                 <a:latin typeface="Arial" panose="020B0604020202020204" pitchFamily="34" charset="0"/>
                 <a:cs typeface="Arial" panose="020B0604020202020204" pitchFamily="34" charset="0"/>
               </a:rPr>
-              <a:t>(c)</a:t>
+              <a:t>C</a:t>
             </a:r>
           </a:p>
         </p:txBody>

</xml_diff>